<commit_message>
fixed a few minor things, ppt done
</commit_message>
<xml_diff>
--- a/tamagothchi_ppt.pptx
+++ b/tamagothchi_ppt.pptx
@@ -3,14 +3,18 @@
 <p:presentation xmlns:a="http://schemas.openxmlformats.org/drawingml/2006/main" xmlns:p="http://schemas.openxmlformats.org/presentationml/2006/main" xmlns:r="http://schemas.openxmlformats.org/officeDocument/2006/relationships" xmlns:p14="http://schemas.microsoft.com/office/powerpoint/2010/main" xmlns:p15="http://schemas.microsoft.com/office/powerpoint/2012/main" xmlns:mc="http://schemas.openxmlformats.org/markup-compatibility/2006">
   <p:sldMasterIdLst>
     <p:sldMasterId id="2147483648" r:id="rId2"/>
+    <p:sldMasterId id="2147483661" r:id="rId3"/>
   </p:sldMasterIdLst>
   <p:sldIdLst>
-    <p:sldId id="256" r:id="rId3"/>
-    <p:sldId id="257" r:id="rId4"/>
-    <p:sldId id="258" r:id="rId5"/>
-    <p:sldId id="259" r:id="rId6"/>
-    <p:sldId id="260" r:id="rId7"/>
-    <p:sldId id="261" r:id="rId8"/>
+    <p:sldId id="256" r:id="rId4"/>
+    <p:sldId id="257" r:id="rId5"/>
+    <p:sldId id="258" r:id="rId6"/>
+    <p:sldId id="259" r:id="rId7"/>
+    <p:sldId id="260" r:id="rId8"/>
+    <p:sldId id="261" r:id="rId9"/>
+    <p:sldId id="262" r:id="rId10"/>
+    <p:sldId id="263" r:id="rId11"/>
+    <p:sldId id="264" r:id="rId12"/>
   </p:sldIdLst>
   <p:sldSz cx="10080625" cy="7559675"/>
   <p:notesSz cx="7772400" cy="10058400"/>
@@ -58,7 +62,7 @@
       </p:grpSpPr>
       <p:sp>
         <p:nvSpPr>
-          <p:cNvPr id="26" name="PlaceHolder 1"/>
+          <p:cNvPr id="23" name="PlaceHolder 1"/>
           <p:cNvSpPr>
             <a:spLocks noGrp="1"/>
           </p:cNvSpPr>
@@ -69,7 +73,7 @@
         <p:spPr>
           <a:xfrm>
             <a:off x="504000" y="301320"/>
-            <a:ext cx="9071640" cy="1262160"/>
+            <a:ext cx="9071280" cy="1261800"/>
           </a:xfrm>
           <a:prstGeom prst="rect">
             <a:avLst/>
@@ -95,7 +99,7 @@
       </p:sp>
       <p:sp>
         <p:nvSpPr>
-          <p:cNvPr id="27" name="PlaceHolder 2"/>
+          <p:cNvPr id="24" name="PlaceHolder 2"/>
           <p:cNvSpPr>
             <a:spLocks noGrp="1"/>
           </p:cNvSpPr>
@@ -106,7 +110,7 @@
         <p:spPr>
           <a:xfrm>
             <a:off x="504000" y="1769040"/>
-            <a:ext cx="9071640" cy="2091240"/>
+            <a:ext cx="9071280" cy="2090880"/>
           </a:xfrm>
           <a:prstGeom prst="rect">
             <a:avLst/>
@@ -131,7 +135,7 @@
       </p:sp>
       <p:sp>
         <p:nvSpPr>
-          <p:cNvPr id="28" name="PlaceHolder 3"/>
+          <p:cNvPr id="25" name="PlaceHolder 3"/>
           <p:cNvSpPr>
             <a:spLocks noGrp="1"/>
           </p:cNvSpPr>
@@ -141,8 +145,8 @@
         </p:nvSpPr>
         <p:spPr>
           <a:xfrm>
-            <a:off x="504000" y="4059360"/>
-            <a:ext cx="9071640" cy="2091240"/>
+            <a:off x="504000" y="4059000"/>
+            <a:ext cx="9071280" cy="2090880"/>
           </a:xfrm>
           <a:prstGeom prst="rect">
             <a:avLst/>
@@ -189,7 +193,7 @@
       </p:grpSpPr>
       <p:sp>
         <p:nvSpPr>
-          <p:cNvPr id="29" name="PlaceHolder 1"/>
+          <p:cNvPr id="26" name="PlaceHolder 1"/>
           <p:cNvSpPr>
             <a:spLocks noGrp="1"/>
           </p:cNvSpPr>
@@ -200,7 +204,7 @@
         <p:spPr>
           <a:xfrm>
             <a:off x="504000" y="301320"/>
-            <a:ext cx="9071640" cy="1262160"/>
+            <a:ext cx="9071280" cy="1261800"/>
           </a:xfrm>
           <a:prstGeom prst="rect">
             <a:avLst/>
@@ -226,7 +230,7 @@
       </p:sp>
       <p:sp>
         <p:nvSpPr>
-          <p:cNvPr id="30" name="PlaceHolder 2"/>
+          <p:cNvPr id="27" name="PlaceHolder 2"/>
           <p:cNvSpPr>
             <a:spLocks noGrp="1"/>
           </p:cNvSpPr>
@@ -237,7 +241,7 @@
         <p:spPr>
           <a:xfrm>
             <a:off x="504000" y="1769040"/>
-            <a:ext cx="4426920" cy="2091240"/>
+            <a:ext cx="4426560" cy="2090880"/>
           </a:xfrm>
           <a:prstGeom prst="rect">
             <a:avLst/>
@@ -262,7 +266,7 @@
       </p:sp>
       <p:sp>
         <p:nvSpPr>
-          <p:cNvPr id="31" name="PlaceHolder 3"/>
+          <p:cNvPr id="28" name="PlaceHolder 3"/>
           <p:cNvSpPr>
             <a:spLocks noGrp="1"/>
           </p:cNvSpPr>
@@ -272,8 +276,8 @@
         </p:nvSpPr>
         <p:spPr>
           <a:xfrm>
-            <a:off x="5152680" y="1769040"/>
-            <a:ext cx="4426920" cy="2091240"/>
+            <a:off x="5152320" y="1769040"/>
+            <a:ext cx="4426560" cy="2090880"/>
           </a:xfrm>
           <a:prstGeom prst="rect">
             <a:avLst/>
@@ -298,7 +302,7 @@
       </p:sp>
       <p:sp>
         <p:nvSpPr>
-          <p:cNvPr id="32" name="PlaceHolder 4"/>
+          <p:cNvPr id="29" name="PlaceHolder 4"/>
           <p:cNvSpPr>
             <a:spLocks noGrp="1"/>
           </p:cNvSpPr>
@@ -308,8 +312,8 @@
         </p:nvSpPr>
         <p:spPr>
           <a:xfrm>
-            <a:off x="5152680" y="4059360"/>
-            <a:ext cx="4426920" cy="2091240"/>
+            <a:off x="5152320" y="4059000"/>
+            <a:ext cx="4426560" cy="2090880"/>
           </a:xfrm>
           <a:prstGeom prst="rect">
             <a:avLst/>
@@ -334,7 +338,7 @@
       </p:sp>
       <p:sp>
         <p:nvSpPr>
-          <p:cNvPr id="33" name="PlaceHolder 5"/>
+          <p:cNvPr id="30" name="PlaceHolder 5"/>
           <p:cNvSpPr>
             <a:spLocks noGrp="1"/>
           </p:cNvSpPr>
@@ -344,8 +348,8 @@
         </p:nvSpPr>
         <p:spPr>
           <a:xfrm>
-            <a:off x="504000" y="4059360"/>
-            <a:ext cx="4426920" cy="2091240"/>
+            <a:off x="504000" y="4059000"/>
+            <a:ext cx="4426560" cy="2090880"/>
           </a:xfrm>
           <a:prstGeom prst="rect">
             <a:avLst/>
@@ -392,7 +396,7 @@
       </p:grpSpPr>
       <p:sp>
         <p:nvSpPr>
-          <p:cNvPr id="34" name="PlaceHolder 1"/>
+          <p:cNvPr id="31" name="PlaceHolder 1"/>
           <p:cNvSpPr>
             <a:spLocks noGrp="1"/>
           </p:cNvSpPr>
@@ -403,7 +407,7 @@
         <p:spPr>
           <a:xfrm>
             <a:off x="504000" y="301320"/>
-            <a:ext cx="9071640" cy="1262160"/>
+            <a:ext cx="9071280" cy="1261800"/>
           </a:xfrm>
           <a:prstGeom prst="rect">
             <a:avLst/>
@@ -429,7 +433,7 @@
       </p:sp>
       <p:sp>
         <p:nvSpPr>
-          <p:cNvPr id="35" name="PlaceHolder 2"/>
+          <p:cNvPr id="32" name="PlaceHolder 2"/>
           <p:cNvSpPr>
             <a:spLocks noGrp="1"/>
           </p:cNvSpPr>
@@ -440,7 +444,7 @@
         <p:spPr>
           <a:xfrm>
             <a:off x="504000" y="1769040"/>
-            <a:ext cx="9071640" cy="4384440"/>
+            <a:ext cx="9071280" cy="4384080"/>
           </a:xfrm>
           <a:prstGeom prst="rect">
             <a:avLst/>
@@ -465,7 +469,7 @@
       </p:sp>
       <p:sp>
         <p:nvSpPr>
-          <p:cNvPr id="36" name="PlaceHolder 3"/>
+          <p:cNvPr id="33" name="PlaceHolder 3"/>
           <p:cNvSpPr>
             <a:spLocks noGrp="1"/>
           </p:cNvSpPr>
@@ -476,7 +480,7 @@
         <p:spPr>
           <a:xfrm>
             <a:off x="504000" y="1769040"/>
-            <a:ext cx="9071640" cy="4384440"/>
+            <a:ext cx="9071280" cy="4384080"/>
           </a:xfrm>
           <a:prstGeom prst="rect">
             <a:avLst/>
@@ -501,7 +505,7 @@
       </p:sp>
       <p:pic>
         <p:nvPicPr>
-          <p:cNvPr id="37" name="" descr=""/>
+          <p:cNvPr id="34" name="" descr=""/>
           <p:cNvPicPr/>
           <p:nvPr/>
         </p:nvPicPr>
@@ -511,8 +515,8 @@
         </p:blipFill>
         <p:spPr>
           <a:xfrm>
-            <a:off x="2292120" y="1768680"/>
-            <a:ext cx="5495040" cy="4384440"/>
+            <a:off x="2292120" y="1769040"/>
+            <a:ext cx="5494680" cy="4384080"/>
           </a:xfrm>
           <a:prstGeom prst="rect">
             <a:avLst/>
@@ -524,7 +528,7 @@
       </p:pic>
       <p:pic>
         <p:nvPicPr>
-          <p:cNvPr id="38" name="" descr=""/>
+          <p:cNvPr id="35" name="" descr=""/>
           <p:cNvPicPr/>
           <p:nvPr/>
         </p:nvPicPr>
@@ -534,8 +538,8 @@
         </p:blipFill>
         <p:spPr>
           <a:xfrm>
-            <a:off x="2292120" y="1768680"/>
-            <a:ext cx="5495040" cy="4384440"/>
+            <a:off x="2292120" y="1769040"/>
+            <a:ext cx="5494680" cy="4384080"/>
           </a:xfrm>
           <a:prstGeom prst="rect">
             <a:avLst/>
@@ -545,6 +549,635 @@
           </a:ln>
         </p:spPr>
       </p:pic>
+    </p:spTree>
+  </p:cSld>
+</p:sldLayout>
+</file>
+
+<file path=ppt/slideLayouts/slideLayout13.xml><?xml version="1.0" encoding="utf-8"?>
+<p:sldLayout xmlns:a="http://schemas.openxmlformats.org/drawingml/2006/main" xmlns:p="http://schemas.openxmlformats.org/presentationml/2006/main" xmlns:r="http://schemas.openxmlformats.org/officeDocument/2006/relationships" xmlns:p14="http://schemas.microsoft.com/office/powerpoint/2010/main" xmlns:p15="http://schemas.microsoft.com/office/powerpoint/2012/main" xmlns:mc="http://schemas.openxmlformats.org/markup-compatibility/2006" type="blank" preserve="1">
+  <p:cSld name="Blank Slide">
+    <p:spTree>
+      <p:nvGrpSpPr>
+        <p:cNvPr id="1" name=""/>
+        <p:cNvGrpSpPr/>
+        <p:nvPr/>
+      </p:nvGrpSpPr>
+      <p:grpSpPr>
+        <a:xfrm>
+          <a:off x="0" y="0"/>
+          <a:ext cx="0" cy="0"/>
+          <a:chOff x="0" y="0"/>
+          <a:chExt cx="0" cy="0"/>
+        </a:xfrm>
+      </p:grpSpPr>
+    </p:spTree>
+  </p:cSld>
+</p:sldLayout>
+</file>
+
+<file path=ppt/slideLayouts/slideLayout14.xml><?xml version="1.0" encoding="utf-8"?>
+<p:sldLayout xmlns:a="http://schemas.openxmlformats.org/drawingml/2006/main" xmlns:p="http://schemas.openxmlformats.org/presentationml/2006/main" xmlns:r="http://schemas.openxmlformats.org/officeDocument/2006/relationships" xmlns:p14="http://schemas.microsoft.com/office/powerpoint/2010/main" xmlns:p15="http://schemas.microsoft.com/office/powerpoint/2012/main" xmlns:mc="http://schemas.openxmlformats.org/markup-compatibility/2006" type="tx" preserve="1">
+  <p:cSld name="Title Slide">
+    <p:spTree>
+      <p:nvGrpSpPr>
+        <p:cNvPr id="1" name=""/>
+        <p:cNvGrpSpPr/>
+        <p:nvPr/>
+      </p:nvGrpSpPr>
+      <p:grpSpPr>
+        <a:xfrm>
+          <a:off x="0" y="0"/>
+          <a:ext cx="0" cy="0"/>
+          <a:chOff x="0" y="0"/>
+          <a:chExt cx="0" cy="0"/>
+        </a:xfrm>
+      </p:grpSpPr>
+      <p:sp>
+        <p:nvSpPr>
+          <p:cNvPr id="38" name="PlaceHolder 1"/>
+          <p:cNvSpPr>
+            <a:spLocks noGrp="1"/>
+          </p:cNvSpPr>
+          <p:nvPr>
+            <p:ph type="title"/>
+          </p:nvPr>
+        </p:nvSpPr>
+        <p:spPr>
+          <a:xfrm>
+            <a:off x="504000" y="301320"/>
+            <a:ext cx="9071280" cy="1261800"/>
+          </a:xfrm>
+          <a:prstGeom prst="rect">
+            <a:avLst/>
+          </a:prstGeom>
+        </p:spPr>
+        <p:txBody>
+          <a:bodyPr lIns="0" rIns="0" tIns="0" bIns="0" anchor="ctr"/>
+          <a:p>
+            <a:pPr algn="ctr"/>
+            <a:endParaRPr b="0" lang="en-US" sz="4400" spc="-1" strike="noStrike">
+              <a:solidFill>
+                <a:srgbClr val="000000"/>
+              </a:solidFill>
+              <a:uFill>
+                <a:solidFill>
+                  <a:srgbClr val="ffffff"/>
+                </a:solidFill>
+              </a:uFill>
+              <a:latin typeface="Arial"/>
+            </a:endParaRPr>
+          </a:p>
+        </p:txBody>
+      </p:sp>
+      <p:sp>
+        <p:nvSpPr>
+          <p:cNvPr id="39" name="PlaceHolder 2"/>
+          <p:cNvSpPr>
+            <a:spLocks noGrp="1"/>
+          </p:cNvSpPr>
+          <p:nvPr>
+            <p:ph type="subTitle"/>
+          </p:nvPr>
+        </p:nvSpPr>
+        <p:spPr>
+          <a:xfrm>
+            <a:off x="504000" y="1769040"/>
+            <a:ext cx="9071280" cy="4384080"/>
+          </a:xfrm>
+          <a:prstGeom prst="rect">
+            <a:avLst/>
+          </a:prstGeom>
+        </p:spPr>
+        <p:txBody>
+          <a:bodyPr lIns="0" rIns="0" tIns="0" bIns="0" anchor="ctr"/>
+          <a:p>
+            <a:pPr algn="ctr"/>
+            <a:endParaRPr b="0" lang="en-US" sz="3200" spc="-1" strike="noStrike">
+              <a:solidFill>
+                <a:srgbClr val="000000"/>
+              </a:solidFill>
+              <a:uFill>
+                <a:solidFill>
+                  <a:srgbClr val="ffffff"/>
+                </a:solidFill>
+              </a:uFill>
+              <a:latin typeface="Arial"/>
+            </a:endParaRPr>
+          </a:p>
+        </p:txBody>
+      </p:sp>
+    </p:spTree>
+  </p:cSld>
+</p:sldLayout>
+</file>
+
+<file path=ppt/slideLayouts/slideLayout15.xml><?xml version="1.0" encoding="utf-8"?>
+<p:sldLayout xmlns:a="http://schemas.openxmlformats.org/drawingml/2006/main" xmlns:p="http://schemas.openxmlformats.org/presentationml/2006/main" xmlns:r="http://schemas.openxmlformats.org/officeDocument/2006/relationships" xmlns:p14="http://schemas.microsoft.com/office/powerpoint/2010/main" xmlns:p15="http://schemas.microsoft.com/office/powerpoint/2012/main" xmlns:mc="http://schemas.openxmlformats.org/markup-compatibility/2006" type="obj" preserve="1">
+  <p:cSld name="Title, Content">
+    <p:spTree>
+      <p:nvGrpSpPr>
+        <p:cNvPr id="1" name=""/>
+        <p:cNvGrpSpPr/>
+        <p:nvPr/>
+      </p:nvGrpSpPr>
+      <p:grpSpPr>
+        <a:xfrm>
+          <a:off x="0" y="0"/>
+          <a:ext cx="0" cy="0"/>
+          <a:chOff x="0" y="0"/>
+          <a:chExt cx="0" cy="0"/>
+        </a:xfrm>
+      </p:grpSpPr>
+      <p:sp>
+        <p:nvSpPr>
+          <p:cNvPr id="40" name="PlaceHolder 1"/>
+          <p:cNvSpPr>
+            <a:spLocks noGrp="1"/>
+          </p:cNvSpPr>
+          <p:nvPr>
+            <p:ph type="title"/>
+          </p:nvPr>
+        </p:nvSpPr>
+        <p:spPr>
+          <a:xfrm>
+            <a:off x="504000" y="301320"/>
+            <a:ext cx="9071280" cy="1261800"/>
+          </a:xfrm>
+          <a:prstGeom prst="rect">
+            <a:avLst/>
+          </a:prstGeom>
+        </p:spPr>
+        <p:txBody>
+          <a:bodyPr lIns="0" rIns="0" tIns="0" bIns="0" anchor="ctr"/>
+          <a:p>
+            <a:pPr algn="ctr"/>
+            <a:endParaRPr b="0" lang="en-US" sz="4400" spc="-1" strike="noStrike">
+              <a:solidFill>
+                <a:srgbClr val="000000"/>
+              </a:solidFill>
+              <a:uFill>
+                <a:solidFill>
+                  <a:srgbClr val="ffffff"/>
+                </a:solidFill>
+              </a:uFill>
+              <a:latin typeface="Arial"/>
+            </a:endParaRPr>
+          </a:p>
+        </p:txBody>
+      </p:sp>
+      <p:sp>
+        <p:nvSpPr>
+          <p:cNvPr id="41" name="PlaceHolder 2"/>
+          <p:cNvSpPr>
+            <a:spLocks noGrp="1"/>
+          </p:cNvSpPr>
+          <p:nvPr>
+            <p:ph type="body"/>
+          </p:nvPr>
+        </p:nvSpPr>
+        <p:spPr>
+          <a:xfrm>
+            <a:off x="504000" y="1769040"/>
+            <a:ext cx="9071280" cy="4384080"/>
+          </a:xfrm>
+          <a:prstGeom prst="rect">
+            <a:avLst/>
+          </a:prstGeom>
+        </p:spPr>
+        <p:txBody>
+          <a:bodyPr lIns="0" rIns="0" tIns="0" bIns="0"/>
+          <a:p>
+            <a:endParaRPr b="0" lang="en-US" sz="3200" spc="-1" strike="noStrike">
+              <a:solidFill>
+                <a:srgbClr val="000000"/>
+              </a:solidFill>
+              <a:uFill>
+                <a:solidFill>
+                  <a:srgbClr val="ffffff"/>
+                </a:solidFill>
+              </a:uFill>
+              <a:latin typeface="Arial"/>
+            </a:endParaRPr>
+          </a:p>
+        </p:txBody>
+      </p:sp>
+    </p:spTree>
+  </p:cSld>
+</p:sldLayout>
+</file>
+
+<file path=ppt/slideLayouts/slideLayout16.xml><?xml version="1.0" encoding="utf-8"?>
+<p:sldLayout xmlns:a="http://schemas.openxmlformats.org/drawingml/2006/main" xmlns:p="http://schemas.openxmlformats.org/presentationml/2006/main" xmlns:r="http://schemas.openxmlformats.org/officeDocument/2006/relationships" xmlns:p14="http://schemas.microsoft.com/office/powerpoint/2010/main" xmlns:p15="http://schemas.microsoft.com/office/powerpoint/2012/main" xmlns:mc="http://schemas.openxmlformats.org/markup-compatibility/2006" type="twoObj" preserve="1">
+  <p:cSld name="Title, 2 Content">
+    <p:spTree>
+      <p:nvGrpSpPr>
+        <p:cNvPr id="1" name=""/>
+        <p:cNvGrpSpPr/>
+        <p:nvPr/>
+      </p:nvGrpSpPr>
+      <p:grpSpPr>
+        <a:xfrm>
+          <a:off x="0" y="0"/>
+          <a:ext cx="0" cy="0"/>
+          <a:chOff x="0" y="0"/>
+          <a:chExt cx="0" cy="0"/>
+        </a:xfrm>
+      </p:grpSpPr>
+      <p:sp>
+        <p:nvSpPr>
+          <p:cNvPr id="42" name="PlaceHolder 1"/>
+          <p:cNvSpPr>
+            <a:spLocks noGrp="1"/>
+          </p:cNvSpPr>
+          <p:nvPr>
+            <p:ph type="title"/>
+          </p:nvPr>
+        </p:nvSpPr>
+        <p:spPr>
+          <a:xfrm>
+            <a:off x="504000" y="301320"/>
+            <a:ext cx="9071280" cy="1261800"/>
+          </a:xfrm>
+          <a:prstGeom prst="rect">
+            <a:avLst/>
+          </a:prstGeom>
+        </p:spPr>
+        <p:txBody>
+          <a:bodyPr lIns="0" rIns="0" tIns="0" bIns="0" anchor="ctr"/>
+          <a:p>
+            <a:pPr algn="ctr"/>
+            <a:endParaRPr b="0" lang="en-US" sz="4400" spc="-1" strike="noStrike">
+              <a:solidFill>
+                <a:srgbClr val="000000"/>
+              </a:solidFill>
+              <a:uFill>
+                <a:solidFill>
+                  <a:srgbClr val="ffffff"/>
+                </a:solidFill>
+              </a:uFill>
+              <a:latin typeface="Arial"/>
+            </a:endParaRPr>
+          </a:p>
+        </p:txBody>
+      </p:sp>
+      <p:sp>
+        <p:nvSpPr>
+          <p:cNvPr id="43" name="PlaceHolder 2"/>
+          <p:cNvSpPr>
+            <a:spLocks noGrp="1"/>
+          </p:cNvSpPr>
+          <p:nvPr>
+            <p:ph type="body"/>
+          </p:nvPr>
+        </p:nvSpPr>
+        <p:spPr>
+          <a:xfrm>
+            <a:off x="504000" y="1769040"/>
+            <a:ext cx="4426560" cy="4384080"/>
+          </a:xfrm>
+          <a:prstGeom prst="rect">
+            <a:avLst/>
+          </a:prstGeom>
+        </p:spPr>
+        <p:txBody>
+          <a:bodyPr lIns="0" rIns="0" tIns="0" bIns="0"/>
+          <a:p>
+            <a:endParaRPr b="0" lang="en-US" sz="3200" spc="-1" strike="noStrike">
+              <a:solidFill>
+                <a:srgbClr val="000000"/>
+              </a:solidFill>
+              <a:uFill>
+                <a:solidFill>
+                  <a:srgbClr val="ffffff"/>
+                </a:solidFill>
+              </a:uFill>
+              <a:latin typeface="Arial"/>
+            </a:endParaRPr>
+          </a:p>
+        </p:txBody>
+      </p:sp>
+      <p:sp>
+        <p:nvSpPr>
+          <p:cNvPr id="44" name="PlaceHolder 3"/>
+          <p:cNvSpPr>
+            <a:spLocks noGrp="1"/>
+          </p:cNvSpPr>
+          <p:nvPr>
+            <p:ph type="body"/>
+          </p:nvPr>
+        </p:nvSpPr>
+        <p:spPr>
+          <a:xfrm>
+            <a:off x="5152320" y="1769040"/>
+            <a:ext cx="4426560" cy="4384080"/>
+          </a:xfrm>
+          <a:prstGeom prst="rect">
+            <a:avLst/>
+          </a:prstGeom>
+        </p:spPr>
+        <p:txBody>
+          <a:bodyPr lIns="0" rIns="0" tIns="0" bIns="0"/>
+          <a:p>
+            <a:endParaRPr b="0" lang="en-US" sz="3200" spc="-1" strike="noStrike">
+              <a:solidFill>
+                <a:srgbClr val="000000"/>
+              </a:solidFill>
+              <a:uFill>
+                <a:solidFill>
+                  <a:srgbClr val="ffffff"/>
+                </a:solidFill>
+              </a:uFill>
+              <a:latin typeface="Arial"/>
+            </a:endParaRPr>
+          </a:p>
+        </p:txBody>
+      </p:sp>
+    </p:spTree>
+  </p:cSld>
+</p:sldLayout>
+</file>
+
+<file path=ppt/slideLayouts/slideLayout17.xml><?xml version="1.0" encoding="utf-8"?>
+<p:sldLayout xmlns:a="http://schemas.openxmlformats.org/drawingml/2006/main" xmlns:p="http://schemas.openxmlformats.org/presentationml/2006/main" xmlns:r="http://schemas.openxmlformats.org/officeDocument/2006/relationships" xmlns:p14="http://schemas.microsoft.com/office/powerpoint/2010/main" xmlns:p15="http://schemas.microsoft.com/office/powerpoint/2012/main" xmlns:mc="http://schemas.openxmlformats.org/markup-compatibility/2006" type="titleOnly" preserve="1">
+  <p:cSld name="Title Only">
+    <p:spTree>
+      <p:nvGrpSpPr>
+        <p:cNvPr id="1" name=""/>
+        <p:cNvGrpSpPr/>
+        <p:nvPr/>
+      </p:nvGrpSpPr>
+      <p:grpSpPr>
+        <a:xfrm>
+          <a:off x="0" y="0"/>
+          <a:ext cx="0" cy="0"/>
+          <a:chOff x="0" y="0"/>
+          <a:chExt cx="0" cy="0"/>
+        </a:xfrm>
+      </p:grpSpPr>
+      <p:sp>
+        <p:nvSpPr>
+          <p:cNvPr id="45" name="PlaceHolder 1"/>
+          <p:cNvSpPr>
+            <a:spLocks noGrp="1"/>
+          </p:cNvSpPr>
+          <p:nvPr>
+            <p:ph type="title"/>
+          </p:nvPr>
+        </p:nvSpPr>
+        <p:spPr>
+          <a:xfrm>
+            <a:off x="504000" y="301320"/>
+            <a:ext cx="9071280" cy="1261800"/>
+          </a:xfrm>
+          <a:prstGeom prst="rect">
+            <a:avLst/>
+          </a:prstGeom>
+        </p:spPr>
+        <p:txBody>
+          <a:bodyPr lIns="0" rIns="0" tIns="0" bIns="0" anchor="ctr"/>
+          <a:p>
+            <a:pPr algn="ctr"/>
+            <a:endParaRPr b="0" lang="en-US" sz="4400" spc="-1" strike="noStrike">
+              <a:solidFill>
+                <a:srgbClr val="000000"/>
+              </a:solidFill>
+              <a:uFill>
+                <a:solidFill>
+                  <a:srgbClr val="ffffff"/>
+                </a:solidFill>
+              </a:uFill>
+              <a:latin typeface="Arial"/>
+            </a:endParaRPr>
+          </a:p>
+        </p:txBody>
+      </p:sp>
+    </p:spTree>
+  </p:cSld>
+</p:sldLayout>
+</file>
+
+<file path=ppt/slideLayouts/slideLayout18.xml><?xml version="1.0" encoding="utf-8"?>
+<p:sldLayout xmlns:a="http://schemas.openxmlformats.org/drawingml/2006/main" xmlns:p="http://schemas.openxmlformats.org/presentationml/2006/main" xmlns:r="http://schemas.openxmlformats.org/officeDocument/2006/relationships" xmlns:p14="http://schemas.microsoft.com/office/powerpoint/2010/main" xmlns:p15="http://schemas.microsoft.com/office/powerpoint/2012/main" xmlns:mc="http://schemas.openxmlformats.org/markup-compatibility/2006" type="objOnly" preserve="1">
+  <p:cSld name="Centered Text">
+    <p:spTree>
+      <p:nvGrpSpPr>
+        <p:cNvPr id="1" name=""/>
+        <p:cNvGrpSpPr/>
+        <p:nvPr/>
+      </p:nvGrpSpPr>
+      <p:grpSpPr>
+        <a:xfrm>
+          <a:off x="0" y="0"/>
+          <a:ext cx="0" cy="0"/>
+          <a:chOff x="0" y="0"/>
+          <a:chExt cx="0" cy="0"/>
+        </a:xfrm>
+      </p:grpSpPr>
+      <p:sp>
+        <p:nvSpPr>
+          <p:cNvPr id="46" name="PlaceHolder 1"/>
+          <p:cNvSpPr>
+            <a:spLocks noGrp="1"/>
+          </p:cNvSpPr>
+          <p:nvPr>
+            <p:ph type="subTitle"/>
+          </p:nvPr>
+        </p:nvSpPr>
+        <p:spPr>
+          <a:xfrm>
+            <a:off x="504000" y="301320"/>
+            <a:ext cx="9071280" cy="5850360"/>
+          </a:xfrm>
+          <a:prstGeom prst="rect">
+            <a:avLst/>
+          </a:prstGeom>
+        </p:spPr>
+        <p:txBody>
+          <a:bodyPr lIns="0" rIns="0" tIns="0" bIns="0" anchor="ctr"/>
+          <a:p>
+            <a:pPr algn="ctr"/>
+            <a:endParaRPr b="0" lang="en-US" sz="3200" spc="-1" strike="noStrike">
+              <a:solidFill>
+                <a:srgbClr val="000000"/>
+              </a:solidFill>
+              <a:uFill>
+                <a:solidFill>
+                  <a:srgbClr val="ffffff"/>
+                </a:solidFill>
+              </a:uFill>
+              <a:latin typeface="Arial"/>
+            </a:endParaRPr>
+          </a:p>
+        </p:txBody>
+      </p:sp>
+    </p:spTree>
+  </p:cSld>
+</p:sldLayout>
+</file>
+
+<file path=ppt/slideLayouts/slideLayout19.xml><?xml version="1.0" encoding="utf-8"?>
+<p:sldLayout xmlns:a="http://schemas.openxmlformats.org/drawingml/2006/main" xmlns:p="http://schemas.openxmlformats.org/presentationml/2006/main" xmlns:r="http://schemas.openxmlformats.org/officeDocument/2006/relationships" xmlns:p14="http://schemas.microsoft.com/office/powerpoint/2010/main" xmlns:p15="http://schemas.microsoft.com/office/powerpoint/2012/main" xmlns:mc="http://schemas.openxmlformats.org/markup-compatibility/2006" type="twoObjAndObj" preserve="1">
+  <p:cSld name="Title, 2 Content and Content">
+    <p:spTree>
+      <p:nvGrpSpPr>
+        <p:cNvPr id="1" name=""/>
+        <p:cNvGrpSpPr/>
+        <p:nvPr/>
+      </p:nvGrpSpPr>
+      <p:grpSpPr>
+        <a:xfrm>
+          <a:off x="0" y="0"/>
+          <a:ext cx="0" cy="0"/>
+          <a:chOff x="0" y="0"/>
+          <a:chExt cx="0" cy="0"/>
+        </a:xfrm>
+      </p:grpSpPr>
+      <p:sp>
+        <p:nvSpPr>
+          <p:cNvPr id="47" name="PlaceHolder 1"/>
+          <p:cNvSpPr>
+            <a:spLocks noGrp="1"/>
+          </p:cNvSpPr>
+          <p:nvPr>
+            <p:ph type="title"/>
+          </p:nvPr>
+        </p:nvSpPr>
+        <p:spPr>
+          <a:xfrm>
+            <a:off x="504000" y="301320"/>
+            <a:ext cx="9071280" cy="1261800"/>
+          </a:xfrm>
+          <a:prstGeom prst="rect">
+            <a:avLst/>
+          </a:prstGeom>
+        </p:spPr>
+        <p:txBody>
+          <a:bodyPr lIns="0" rIns="0" tIns="0" bIns="0" anchor="ctr"/>
+          <a:p>
+            <a:pPr algn="ctr"/>
+            <a:endParaRPr b="0" lang="en-US" sz="4400" spc="-1" strike="noStrike">
+              <a:solidFill>
+                <a:srgbClr val="000000"/>
+              </a:solidFill>
+              <a:uFill>
+                <a:solidFill>
+                  <a:srgbClr val="ffffff"/>
+                </a:solidFill>
+              </a:uFill>
+              <a:latin typeface="Arial"/>
+            </a:endParaRPr>
+          </a:p>
+        </p:txBody>
+      </p:sp>
+      <p:sp>
+        <p:nvSpPr>
+          <p:cNvPr id="48" name="PlaceHolder 2"/>
+          <p:cNvSpPr>
+            <a:spLocks noGrp="1"/>
+          </p:cNvSpPr>
+          <p:nvPr>
+            <p:ph type="body"/>
+          </p:nvPr>
+        </p:nvSpPr>
+        <p:spPr>
+          <a:xfrm>
+            <a:off x="504000" y="1769040"/>
+            <a:ext cx="4426560" cy="2090880"/>
+          </a:xfrm>
+          <a:prstGeom prst="rect">
+            <a:avLst/>
+          </a:prstGeom>
+        </p:spPr>
+        <p:txBody>
+          <a:bodyPr lIns="0" rIns="0" tIns="0" bIns="0"/>
+          <a:p>
+            <a:endParaRPr b="0" lang="en-US" sz="3200" spc="-1" strike="noStrike">
+              <a:solidFill>
+                <a:srgbClr val="000000"/>
+              </a:solidFill>
+              <a:uFill>
+                <a:solidFill>
+                  <a:srgbClr val="ffffff"/>
+                </a:solidFill>
+              </a:uFill>
+              <a:latin typeface="Arial"/>
+            </a:endParaRPr>
+          </a:p>
+        </p:txBody>
+      </p:sp>
+      <p:sp>
+        <p:nvSpPr>
+          <p:cNvPr id="49" name="PlaceHolder 3"/>
+          <p:cNvSpPr>
+            <a:spLocks noGrp="1"/>
+          </p:cNvSpPr>
+          <p:nvPr>
+            <p:ph type="body"/>
+          </p:nvPr>
+        </p:nvSpPr>
+        <p:spPr>
+          <a:xfrm>
+            <a:off x="504000" y="4059000"/>
+            <a:ext cx="4426560" cy="2090880"/>
+          </a:xfrm>
+          <a:prstGeom prst="rect">
+            <a:avLst/>
+          </a:prstGeom>
+        </p:spPr>
+        <p:txBody>
+          <a:bodyPr lIns="0" rIns="0" tIns="0" bIns="0"/>
+          <a:p>
+            <a:endParaRPr b="0" lang="en-US" sz="3200" spc="-1" strike="noStrike">
+              <a:solidFill>
+                <a:srgbClr val="000000"/>
+              </a:solidFill>
+              <a:uFill>
+                <a:solidFill>
+                  <a:srgbClr val="ffffff"/>
+                </a:solidFill>
+              </a:uFill>
+              <a:latin typeface="Arial"/>
+            </a:endParaRPr>
+          </a:p>
+        </p:txBody>
+      </p:sp>
+      <p:sp>
+        <p:nvSpPr>
+          <p:cNvPr id="50" name="PlaceHolder 4"/>
+          <p:cNvSpPr>
+            <a:spLocks noGrp="1"/>
+          </p:cNvSpPr>
+          <p:nvPr>
+            <p:ph type="body"/>
+          </p:nvPr>
+        </p:nvSpPr>
+        <p:spPr>
+          <a:xfrm>
+            <a:off x="5152320" y="1769040"/>
+            <a:ext cx="4426560" cy="4384080"/>
+          </a:xfrm>
+          <a:prstGeom prst="rect">
+            <a:avLst/>
+          </a:prstGeom>
+        </p:spPr>
+        <p:txBody>
+          <a:bodyPr lIns="0" rIns="0" tIns="0" bIns="0"/>
+          <a:p>
+            <a:endParaRPr b="0" lang="en-US" sz="3200" spc="-1" strike="noStrike">
+              <a:solidFill>
+                <a:srgbClr val="000000"/>
+              </a:solidFill>
+              <a:uFill>
+                <a:solidFill>
+                  <a:srgbClr val="ffffff"/>
+                </a:solidFill>
+              </a:uFill>
+              <a:latin typeface="Arial"/>
+            </a:endParaRPr>
+          </a:p>
+        </p:txBody>
+      </p:sp>
     </p:spTree>
   </p:cSld>
 </p:sldLayout>
@@ -569,7 +1202,7 @@
       </p:grpSpPr>
       <p:sp>
         <p:nvSpPr>
-          <p:cNvPr id="5" name="PlaceHolder 1"/>
+          <p:cNvPr id="2" name="PlaceHolder 1"/>
           <p:cNvSpPr>
             <a:spLocks noGrp="1"/>
           </p:cNvSpPr>
@@ -580,7 +1213,7 @@
         <p:spPr>
           <a:xfrm>
             <a:off x="504000" y="301320"/>
-            <a:ext cx="9071640" cy="1262160"/>
+            <a:ext cx="9071280" cy="1261800"/>
           </a:xfrm>
           <a:prstGeom prst="rect">
             <a:avLst/>
@@ -606,7 +1239,7 @@
       </p:sp>
       <p:sp>
         <p:nvSpPr>
-          <p:cNvPr id="6" name="PlaceHolder 2"/>
+          <p:cNvPr id="3" name="PlaceHolder 2"/>
           <p:cNvSpPr>
             <a:spLocks noGrp="1"/>
           </p:cNvSpPr>
@@ -617,7 +1250,7 @@
         <p:spPr>
           <a:xfrm>
             <a:off x="504000" y="1769040"/>
-            <a:ext cx="9071640" cy="4384440"/>
+            <a:ext cx="9071280" cy="4384080"/>
           </a:xfrm>
           <a:prstGeom prst="rect">
             <a:avLst/>
@@ -641,6 +1274,851 @@
           </a:p>
         </p:txBody>
       </p:sp>
+    </p:spTree>
+  </p:cSld>
+</p:sldLayout>
+</file>
+
+<file path=ppt/slideLayouts/slideLayout20.xml><?xml version="1.0" encoding="utf-8"?>
+<p:sldLayout xmlns:a="http://schemas.openxmlformats.org/drawingml/2006/main" xmlns:p="http://schemas.openxmlformats.org/presentationml/2006/main" xmlns:r="http://schemas.openxmlformats.org/officeDocument/2006/relationships" xmlns:p14="http://schemas.microsoft.com/office/powerpoint/2010/main" xmlns:p15="http://schemas.microsoft.com/office/powerpoint/2012/main" xmlns:mc="http://schemas.openxmlformats.org/markup-compatibility/2006" type="objAndTwoObj" preserve="1">
+  <p:cSld name="Title Content and 2 Content">
+    <p:spTree>
+      <p:nvGrpSpPr>
+        <p:cNvPr id="1" name=""/>
+        <p:cNvGrpSpPr/>
+        <p:nvPr/>
+      </p:nvGrpSpPr>
+      <p:grpSpPr>
+        <a:xfrm>
+          <a:off x="0" y="0"/>
+          <a:ext cx="0" cy="0"/>
+          <a:chOff x="0" y="0"/>
+          <a:chExt cx="0" cy="0"/>
+        </a:xfrm>
+      </p:grpSpPr>
+      <p:sp>
+        <p:nvSpPr>
+          <p:cNvPr id="51" name="PlaceHolder 1"/>
+          <p:cNvSpPr>
+            <a:spLocks noGrp="1"/>
+          </p:cNvSpPr>
+          <p:nvPr>
+            <p:ph type="title"/>
+          </p:nvPr>
+        </p:nvSpPr>
+        <p:spPr>
+          <a:xfrm>
+            <a:off x="504000" y="301320"/>
+            <a:ext cx="9071280" cy="1261800"/>
+          </a:xfrm>
+          <a:prstGeom prst="rect">
+            <a:avLst/>
+          </a:prstGeom>
+        </p:spPr>
+        <p:txBody>
+          <a:bodyPr lIns="0" rIns="0" tIns="0" bIns="0" anchor="ctr"/>
+          <a:p>
+            <a:pPr algn="ctr"/>
+            <a:endParaRPr b="0" lang="en-US" sz="4400" spc="-1" strike="noStrike">
+              <a:solidFill>
+                <a:srgbClr val="000000"/>
+              </a:solidFill>
+              <a:uFill>
+                <a:solidFill>
+                  <a:srgbClr val="ffffff"/>
+                </a:solidFill>
+              </a:uFill>
+              <a:latin typeface="Arial"/>
+            </a:endParaRPr>
+          </a:p>
+        </p:txBody>
+      </p:sp>
+      <p:sp>
+        <p:nvSpPr>
+          <p:cNvPr id="52" name="PlaceHolder 2"/>
+          <p:cNvSpPr>
+            <a:spLocks noGrp="1"/>
+          </p:cNvSpPr>
+          <p:nvPr>
+            <p:ph type="body"/>
+          </p:nvPr>
+        </p:nvSpPr>
+        <p:spPr>
+          <a:xfrm>
+            <a:off x="504000" y="1769040"/>
+            <a:ext cx="4426560" cy="4384080"/>
+          </a:xfrm>
+          <a:prstGeom prst="rect">
+            <a:avLst/>
+          </a:prstGeom>
+        </p:spPr>
+        <p:txBody>
+          <a:bodyPr lIns="0" rIns="0" tIns="0" bIns="0"/>
+          <a:p>
+            <a:endParaRPr b="0" lang="en-US" sz="3200" spc="-1" strike="noStrike">
+              <a:solidFill>
+                <a:srgbClr val="000000"/>
+              </a:solidFill>
+              <a:uFill>
+                <a:solidFill>
+                  <a:srgbClr val="ffffff"/>
+                </a:solidFill>
+              </a:uFill>
+              <a:latin typeface="Arial"/>
+            </a:endParaRPr>
+          </a:p>
+        </p:txBody>
+      </p:sp>
+      <p:sp>
+        <p:nvSpPr>
+          <p:cNvPr id="53" name="PlaceHolder 3"/>
+          <p:cNvSpPr>
+            <a:spLocks noGrp="1"/>
+          </p:cNvSpPr>
+          <p:nvPr>
+            <p:ph type="body"/>
+          </p:nvPr>
+        </p:nvSpPr>
+        <p:spPr>
+          <a:xfrm>
+            <a:off x="5152320" y="1769040"/>
+            <a:ext cx="4426560" cy="2090880"/>
+          </a:xfrm>
+          <a:prstGeom prst="rect">
+            <a:avLst/>
+          </a:prstGeom>
+        </p:spPr>
+        <p:txBody>
+          <a:bodyPr lIns="0" rIns="0" tIns="0" bIns="0"/>
+          <a:p>
+            <a:endParaRPr b="0" lang="en-US" sz="3200" spc="-1" strike="noStrike">
+              <a:solidFill>
+                <a:srgbClr val="000000"/>
+              </a:solidFill>
+              <a:uFill>
+                <a:solidFill>
+                  <a:srgbClr val="ffffff"/>
+                </a:solidFill>
+              </a:uFill>
+              <a:latin typeface="Arial"/>
+            </a:endParaRPr>
+          </a:p>
+        </p:txBody>
+      </p:sp>
+      <p:sp>
+        <p:nvSpPr>
+          <p:cNvPr id="54" name="PlaceHolder 4"/>
+          <p:cNvSpPr>
+            <a:spLocks noGrp="1"/>
+          </p:cNvSpPr>
+          <p:nvPr>
+            <p:ph type="body"/>
+          </p:nvPr>
+        </p:nvSpPr>
+        <p:spPr>
+          <a:xfrm>
+            <a:off x="5152320" y="4059000"/>
+            <a:ext cx="4426560" cy="2090880"/>
+          </a:xfrm>
+          <a:prstGeom prst="rect">
+            <a:avLst/>
+          </a:prstGeom>
+        </p:spPr>
+        <p:txBody>
+          <a:bodyPr lIns="0" rIns="0" tIns="0" bIns="0"/>
+          <a:p>
+            <a:endParaRPr b="0" lang="en-US" sz="3200" spc="-1" strike="noStrike">
+              <a:solidFill>
+                <a:srgbClr val="000000"/>
+              </a:solidFill>
+              <a:uFill>
+                <a:solidFill>
+                  <a:srgbClr val="ffffff"/>
+                </a:solidFill>
+              </a:uFill>
+              <a:latin typeface="Arial"/>
+            </a:endParaRPr>
+          </a:p>
+        </p:txBody>
+      </p:sp>
+    </p:spTree>
+  </p:cSld>
+</p:sldLayout>
+</file>
+
+<file path=ppt/slideLayouts/slideLayout21.xml><?xml version="1.0" encoding="utf-8"?>
+<p:sldLayout xmlns:a="http://schemas.openxmlformats.org/drawingml/2006/main" xmlns:p="http://schemas.openxmlformats.org/presentationml/2006/main" xmlns:r="http://schemas.openxmlformats.org/officeDocument/2006/relationships" xmlns:p14="http://schemas.microsoft.com/office/powerpoint/2010/main" xmlns:p15="http://schemas.microsoft.com/office/powerpoint/2012/main" xmlns:mc="http://schemas.openxmlformats.org/markup-compatibility/2006" type="twoObjOverTx" preserve="1">
+  <p:cSld name="Title, 2 Content over Content">
+    <p:spTree>
+      <p:nvGrpSpPr>
+        <p:cNvPr id="1" name=""/>
+        <p:cNvGrpSpPr/>
+        <p:nvPr/>
+      </p:nvGrpSpPr>
+      <p:grpSpPr>
+        <a:xfrm>
+          <a:off x="0" y="0"/>
+          <a:ext cx="0" cy="0"/>
+          <a:chOff x="0" y="0"/>
+          <a:chExt cx="0" cy="0"/>
+        </a:xfrm>
+      </p:grpSpPr>
+      <p:sp>
+        <p:nvSpPr>
+          <p:cNvPr id="55" name="PlaceHolder 1"/>
+          <p:cNvSpPr>
+            <a:spLocks noGrp="1"/>
+          </p:cNvSpPr>
+          <p:nvPr>
+            <p:ph type="title"/>
+          </p:nvPr>
+        </p:nvSpPr>
+        <p:spPr>
+          <a:xfrm>
+            <a:off x="504000" y="301320"/>
+            <a:ext cx="9071280" cy="1261800"/>
+          </a:xfrm>
+          <a:prstGeom prst="rect">
+            <a:avLst/>
+          </a:prstGeom>
+        </p:spPr>
+        <p:txBody>
+          <a:bodyPr lIns="0" rIns="0" tIns="0" bIns="0" anchor="ctr"/>
+          <a:p>
+            <a:pPr algn="ctr"/>
+            <a:endParaRPr b="0" lang="en-US" sz="4400" spc="-1" strike="noStrike">
+              <a:solidFill>
+                <a:srgbClr val="000000"/>
+              </a:solidFill>
+              <a:uFill>
+                <a:solidFill>
+                  <a:srgbClr val="ffffff"/>
+                </a:solidFill>
+              </a:uFill>
+              <a:latin typeface="Arial"/>
+            </a:endParaRPr>
+          </a:p>
+        </p:txBody>
+      </p:sp>
+      <p:sp>
+        <p:nvSpPr>
+          <p:cNvPr id="56" name="PlaceHolder 2"/>
+          <p:cNvSpPr>
+            <a:spLocks noGrp="1"/>
+          </p:cNvSpPr>
+          <p:nvPr>
+            <p:ph type="body"/>
+          </p:nvPr>
+        </p:nvSpPr>
+        <p:spPr>
+          <a:xfrm>
+            <a:off x="504000" y="1769040"/>
+            <a:ext cx="4426560" cy="2090880"/>
+          </a:xfrm>
+          <a:prstGeom prst="rect">
+            <a:avLst/>
+          </a:prstGeom>
+        </p:spPr>
+        <p:txBody>
+          <a:bodyPr lIns="0" rIns="0" tIns="0" bIns="0"/>
+          <a:p>
+            <a:endParaRPr b="0" lang="en-US" sz="3200" spc="-1" strike="noStrike">
+              <a:solidFill>
+                <a:srgbClr val="000000"/>
+              </a:solidFill>
+              <a:uFill>
+                <a:solidFill>
+                  <a:srgbClr val="ffffff"/>
+                </a:solidFill>
+              </a:uFill>
+              <a:latin typeface="Arial"/>
+            </a:endParaRPr>
+          </a:p>
+        </p:txBody>
+      </p:sp>
+      <p:sp>
+        <p:nvSpPr>
+          <p:cNvPr id="57" name="PlaceHolder 3"/>
+          <p:cNvSpPr>
+            <a:spLocks noGrp="1"/>
+          </p:cNvSpPr>
+          <p:nvPr>
+            <p:ph type="body"/>
+          </p:nvPr>
+        </p:nvSpPr>
+        <p:spPr>
+          <a:xfrm>
+            <a:off x="5152320" y="1769040"/>
+            <a:ext cx="4426560" cy="2090880"/>
+          </a:xfrm>
+          <a:prstGeom prst="rect">
+            <a:avLst/>
+          </a:prstGeom>
+        </p:spPr>
+        <p:txBody>
+          <a:bodyPr lIns="0" rIns="0" tIns="0" bIns="0"/>
+          <a:p>
+            <a:endParaRPr b="0" lang="en-US" sz="3200" spc="-1" strike="noStrike">
+              <a:solidFill>
+                <a:srgbClr val="000000"/>
+              </a:solidFill>
+              <a:uFill>
+                <a:solidFill>
+                  <a:srgbClr val="ffffff"/>
+                </a:solidFill>
+              </a:uFill>
+              <a:latin typeface="Arial"/>
+            </a:endParaRPr>
+          </a:p>
+        </p:txBody>
+      </p:sp>
+      <p:sp>
+        <p:nvSpPr>
+          <p:cNvPr id="58" name="PlaceHolder 4"/>
+          <p:cNvSpPr>
+            <a:spLocks noGrp="1"/>
+          </p:cNvSpPr>
+          <p:nvPr>
+            <p:ph type="body"/>
+          </p:nvPr>
+        </p:nvSpPr>
+        <p:spPr>
+          <a:xfrm>
+            <a:off x="504000" y="4059000"/>
+            <a:ext cx="9071280" cy="2090880"/>
+          </a:xfrm>
+          <a:prstGeom prst="rect">
+            <a:avLst/>
+          </a:prstGeom>
+        </p:spPr>
+        <p:txBody>
+          <a:bodyPr lIns="0" rIns="0" tIns="0" bIns="0"/>
+          <a:p>
+            <a:endParaRPr b="0" lang="en-US" sz="3200" spc="-1" strike="noStrike">
+              <a:solidFill>
+                <a:srgbClr val="000000"/>
+              </a:solidFill>
+              <a:uFill>
+                <a:solidFill>
+                  <a:srgbClr val="ffffff"/>
+                </a:solidFill>
+              </a:uFill>
+              <a:latin typeface="Arial"/>
+            </a:endParaRPr>
+          </a:p>
+        </p:txBody>
+      </p:sp>
+    </p:spTree>
+  </p:cSld>
+</p:sldLayout>
+</file>
+
+<file path=ppt/slideLayouts/slideLayout22.xml><?xml version="1.0" encoding="utf-8"?>
+<p:sldLayout xmlns:a="http://schemas.openxmlformats.org/drawingml/2006/main" xmlns:p="http://schemas.openxmlformats.org/presentationml/2006/main" xmlns:r="http://schemas.openxmlformats.org/officeDocument/2006/relationships" xmlns:p14="http://schemas.microsoft.com/office/powerpoint/2010/main" xmlns:p15="http://schemas.microsoft.com/office/powerpoint/2012/main" xmlns:mc="http://schemas.openxmlformats.org/markup-compatibility/2006" type="objOverTx" preserve="1">
+  <p:cSld name="Title, Content over Content">
+    <p:spTree>
+      <p:nvGrpSpPr>
+        <p:cNvPr id="1" name=""/>
+        <p:cNvGrpSpPr/>
+        <p:nvPr/>
+      </p:nvGrpSpPr>
+      <p:grpSpPr>
+        <a:xfrm>
+          <a:off x="0" y="0"/>
+          <a:ext cx="0" cy="0"/>
+          <a:chOff x="0" y="0"/>
+          <a:chExt cx="0" cy="0"/>
+        </a:xfrm>
+      </p:grpSpPr>
+      <p:sp>
+        <p:nvSpPr>
+          <p:cNvPr id="59" name="PlaceHolder 1"/>
+          <p:cNvSpPr>
+            <a:spLocks noGrp="1"/>
+          </p:cNvSpPr>
+          <p:nvPr>
+            <p:ph type="title"/>
+          </p:nvPr>
+        </p:nvSpPr>
+        <p:spPr>
+          <a:xfrm>
+            <a:off x="504000" y="301320"/>
+            <a:ext cx="9071280" cy="1261800"/>
+          </a:xfrm>
+          <a:prstGeom prst="rect">
+            <a:avLst/>
+          </a:prstGeom>
+        </p:spPr>
+        <p:txBody>
+          <a:bodyPr lIns="0" rIns="0" tIns="0" bIns="0" anchor="ctr"/>
+          <a:p>
+            <a:pPr algn="ctr"/>
+            <a:endParaRPr b="0" lang="en-US" sz="4400" spc="-1" strike="noStrike">
+              <a:solidFill>
+                <a:srgbClr val="000000"/>
+              </a:solidFill>
+              <a:uFill>
+                <a:solidFill>
+                  <a:srgbClr val="ffffff"/>
+                </a:solidFill>
+              </a:uFill>
+              <a:latin typeface="Arial"/>
+            </a:endParaRPr>
+          </a:p>
+        </p:txBody>
+      </p:sp>
+      <p:sp>
+        <p:nvSpPr>
+          <p:cNvPr id="60" name="PlaceHolder 2"/>
+          <p:cNvSpPr>
+            <a:spLocks noGrp="1"/>
+          </p:cNvSpPr>
+          <p:nvPr>
+            <p:ph type="body"/>
+          </p:nvPr>
+        </p:nvSpPr>
+        <p:spPr>
+          <a:xfrm>
+            <a:off x="504000" y="1769040"/>
+            <a:ext cx="9071280" cy="2090880"/>
+          </a:xfrm>
+          <a:prstGeom prst="rect">
+            <a:avLst/>
+          </a:prstGeom>
+        </p:spPr>
+        <p:txBody>
+          <a:bodyPr lIns="0" rIns="0" tIns="0" bIns="0"/>
+          <a:p>
+            <a:endParaRPr b="0" lang="en-US" sz="3200" spc="-1" strike="noStrike">
+              <a:solidFill>
+                <a:srgbClr val="000000"/>
+              </a:solidFill>
+              <a:uFill>
+                <a:solidFill>
+                  <a:srgbClr val="ffffff"/>
+                </a:solidFill>
+              </a:uFill>
+              <a:latin typeface="Arial"/>
+            </a:endParaRPr>
+          </a:p>
+        </p:txBody>
+      </p:sp>
+      <p:sp>
+        <p:nvSpPr>
+          <p:cNvPr id="61" name="PlaceHolder 3"/>
+          <p:cNvSpPr>
+            <a:spLocks noGrp="1"/>
+          </p:cNvSpPr>
+          <p:nvPr>
+            <p:ph type="body"/>
+          </p:nvPr>
+        </p:nvSpPr>
+        <p:spPr>
+          <a:xfrm>
+            <a:off x="504000" y="4059000"/>
+            <a:ext cx="9071280" cy="2090880"/>
+          </a:xfrm>
+          <a:prstGeom prst="rect">
+            <a:avLst/>
+          </a:prstGeom>
+        </p:spPr>
+        <p:txBody>
+          <a:bodyPr lIns="0" rIns="0" tIns="0" bIns="0"/>
+          <a:p>
+            <a:endParaRPr b="0" lang="en-US" sz="3200" spc="-1" strike="noStrike">
+              <a:solidFill>
+                <a:srgbClr val="000000"/>
+              </a:solidFill>
+              <a:uFill>
+                <a:solidFill>
+                  <a:srgbClr val="ffffff"/>
+                </a:solidFill>
+              </a:uFill>
+              <a:latin typeface="Arial"/>
+            </a:endParaRPr>
+          </a:p>
+        </p:txBody>
+      </p:sp>
+    </p:spTree>
+  </p:cSld>
+</p:sldLayout>
+</file>
+
+<file path=ppt/slideLayouts/slideLayout23.xml><?xml version="1.0" encoding="utf-8"?>
+<p:sldLayout xmlns:a="http://schemas.openxmlformats.org/drawingml/2006/main" xmlns:p="http://schemas.openxmlformats.org/presentationml/2006/main" xmlns:r="http://schemas.openxmlformats.org/officeDocument/2006/relationships" xmlns:p14="http://schemas.microsoft.com/office/powerpoint/2010/main" xmlns:p15="http://schemas.microsoft.com/office/powerpoint/2012/main" xmlns:mc="http://schemas.openxmlformats.org/markup-compatibility/2006" type="fourObj" preserve="1">
+  <p:cSld name="Title, 4 Content">
+    <p:spTree>
+      <p:nvGrpSpPr>
+        <p:cNvPr id="1" name=""/>
+        <p:cNvGrpSpPr/>
+        <p:nvPr/>
+      </p:nvGrpSpPr>
+      <p:grpSpPr>
+        <a:xfrm>
+          <a:off x="0" y="0"/>
+          <a:ext cx="0" cy="0"/>
+          <a:chOff x="0" y="0"/>
+          <a:chExt cx="0" cy="0"/>
+        </a:xfrm>
+      </p:grpSpPr>
+      <p:sp>
+        <p:nvSpPr>
+          <p:cNvPr id="62" name="PlaceHolder 1"/>
+          <p:cNvSpPr>
+            <a:spLocks noGrp="1"/>
+          </p:cNvSpPr>
+          <p:nvPr>
+            <p:ph type="title"/>
+          </p:nvPr>
+        </p:nvSpPr>
+        <p:spPr>
+          <a:xfrm>
+            <a:off x="504000" y="301320"/>
+            <a:ext cx="9071280" cy="1261800"/>
+          </a:xfrm>
+          <a:prstGeom prst="rect">
+            <a:avLst/>
+          </a:prstGeom>
+        </p:spPr>
+        <p:txBody>
+          <a:bodyPr lIns="0" rIns="0" tIns="0" bIns="0" anchor="ctr"/>
+          <a:p>
+            <a:pPr algn="ctr"/>
+            <a:endParaRPr b="0" lang="en-US" sz="4400" spc="-1" strike="noStrike">
+              <a:solidFill>
+                <a:srgbClr val="000000"/>
+              </a:solidFill>
+              <a:uFill>
+                <a:solidFill>
+                  <a:srgbClr val="ffffff"/>
+                </a:solidFill>
+              </a:uFill>
+              <a:latin typeface="Arial"/>
+            </a:endParaRPr>
+          </a:p>
+        </p:txBody>
+      </p:sp>
+      <p:sp>
+        <p:nvSpPr>
+          <p:cNvPr id="63" name="PlaceHolder 2"/>
+          <p:cNvSpPr>
+            <a:spLocks noGrp="1"/>
+          </p:cNvSpPr>
+          <p:nvPr>
+            <p:ph type="body"/>
+          </p:nvPr>
+        </p:nvSpPr>
+        <p:spPr>
+          <a:xfrm>
+            <a:off x="504000" y="1769040"/>
+            <a:ext cx="4426560" cy="2090880"/>
+          </a:xfrm>
+          <a:prstGeom prst="rect">
+            <a:avLst/>
+          </a:prstGeom>
+        </p:spPr>
+        <p:txBody>
+          <a:bodyPr lIns="0" rIns="0" tIns="0" bIns="0"/>
+          <a:p>
+            <a:endParaRPr b="0" lang="en-US" sz="3200" spc="-1" strike="noStrike">
+              <a:solidFill>
+                <a:srgbClr val="000000"/>
+              </a:solidFill>
+              <a:uFill>
+                <a:solidFill>
+                  <a:srgbClr val="ffffff"/>
+                </a:solidFill>
+              </a:uFill>
+              <a:latin typeface="Arial"/>
+            </a:endParaRPr>
+          </a:p>
+        </p:txBody>
+      </p:sp>
+      <p:sp>
+        <p:nvSpPr>
+          <p:cNvPr id="64" name="PlaceHolder 3"/>
+          <p:cNvSpPr>
+            <a:spLocks noGrp="1"/>
+          </p:cNvSpPr>
+          <p:nvPr>
+            <p:ph type="body"/>
+          </p:nvPr>
+        </p:nvSpPr>
+        <p:spPr>
+          <a:xfrm>
+            <a:off x="5152320" y="1769040"/>
+            <a:ext cx="4426560" cy="2090880"/>
+          </a:xfrm>
+          <a:prstGeom prst="rect">
+            <a:avLst/>
+          </a:prstGeom>
+        </p:spPr>
+        <p:txBody>
+          <a:bodyPr lIns="0" rIns="0" tIns="0" bIns="0"/>
+          <a:p>
+            <a:endParaRPr b="0" lang="en-US" sz="3200" spc="-1" strike="noStrike">
+              <a:solidFill>
+                <a:srgbClr val="000000"/>
+              </a:solidFill>
+              <a:uFill>
+                <a:solidFill>
+                  <a:srgbClr val="ffffff"/>
+                </a:solidFill>
+              </a:uFill>
+              <a:latin typeface="Arial"/>
+            </a:endParaRPr>
+          </a:p>
+        </p:txBody>
+      </p:sp>
+      <p:sp>
+        <p:nvSpPr>
+          <p:cNvPr id="65" name="PlaceHolder 4"/>
+          <p:cNvSpPr>
+            <a:spLocks noGrp="1"/>
+          </p:cNvSpPr>
+          <p:nvPr>
+            <p:ph type="body"/>
+          </p:nvPr>
+        </p:nvSpPr>
+        <p:spPr>
+          <a:xfrm>
+            <a:off x="5152320" y="4059000"/>
+            <a:ext cx="4426560" cy="2090880"/>
+          </a:xfrm>
+          <a:prstGeom prst="rect">
+            <a:avLst/>
+          </a:prstGeom>
+        </p:spPr>
+        <p:txBody>
+          <a:bodyPr lIns="0" rIns="0" tIns="0" bIns="0"/>
+          <a:p>
+            <a:endParaRPr b="0" lang="en-US" sz="3200" spc="-1" strike="noStrike">
+              <a:solidFill>
+                <a:srgbClr val="000000"/>
+              </a:solidFill>
+              <a:uFill>
+                <a:solidFill>
+                  <a:srgbClr val="ffffff"/>
+                </a:solidFill>
+              </a:uFill>
+              <a:latin typeface="Arial"/>
+            </a:endParaRPr>
+          </a:p>
+        </p:txBody>
+      </p:sp>
+      <p:sp>
+        <p:nvSpPr>
+          <p:cNvPr id="66" name="PlaceHolder 5"/>
+          <p:cNvSpPr>
+            <a:spLocks noGrp="1"/>
+          </p:cNvSpPr>
+          <p:nvPr>
+            <p:ph type="body"/>
+          </p:nvPr>
+        </p:nvSpPr>
+        <p:spPr>
+          <a:xfrm>
+            <a:off x="504000" y="4059000"/>
+            <a:ext cx="4426560" cy="2090880"/>
+          </a:xfrm>
+          <a:prstGeom prst="rect">
+            <a:avLst/>
+          </a:prstGeom>
+        </p:spPr>
+        <p:txBody>
+          <a:bodyPr lIns="0" rIns="0" tIns="0" bIns="0"/>
+          <a:p>
+            <a:endParaRPr b="0" lang="en-US" sz="3200" spc="-1" strike="noStrike">
+              <a:solidFill>
+                <a:srgbClr val="000000"/>
+              </a:solidFill>
+              <a:uFill>
+                <a:solidFill>
+                  <a:srgbClr val="ffffff"/>
+                </a:solidFill>
+              </a:uFill>
+              <a:latin typeface="Arial"/>
+            </a:endParaRPr>
+          </a:p>
+        </p:txBody>
+      </p:sp>
+    </p:spTree>
+  </p:cSld>
+</p:sldLayout>
+</file>
+
+<file path=ppt/slideLayouts/slideLayout24.xml><?xml version="1.0" encoding="utf-8"?>
+<p:sldLayout xmlns:a="http://schemas.openxmlformats.org/drawingml/2006/main" xmlns:p="http://schemas.openxmlformats.org/presentationml/2006/main" xmlns:r="http://schemas.openxmlformats.org/officeDocument/2006/relationships" xmlns:p14="http://schemas.microsoft.com/office/powerpoint/2010/main" xmlns:p15="http://schemas.microsoft.com/office/powerpoint/2012/main" xmlns:mc="http://schemas.openxmlformats.org/markup-compatibility/2006" type="blank" preserve="1">
+  <p:cSld name="Title, 6 Content">
+    <p:spTree>
+      <p:nvGrpSpPr>
+        <p:cNvPr id="1" name=""/>
+        <p:cNvGrpSpPr/>
+        <p:nvPr/>
+      </p:nvGrpSpPr>
+      <p:grpSpPr>
+        <a:xfrm>
+          <a:off x="0" y="0"/>
+          <a:ext cx="0" cy="0"/>
+          <a:chOff x="0" y="0"/>
+          <a:chExt cx="0" cy="0"/>
+        </a:xfrm>
+      </p:grpSpPr>
+      <p:sp>
+        <p:nvSpPr>
+          <p:cNvPr id="67" name="PlaceHolder 1"/>
+          <p:cNvSpPr>
+            <a:spLocks noGrp="1"/>
+          </p:cNvSpPr>
+          <p:nvPr>
+            <p:ph type="title"/>
+          </p:nvPr>
+        </p:nvSpPr>
+        <p:spPr>
+          <a:xfrm>
+            <a:off x="504000" y="301320"/>
+            <a:ext cx="9071280" cy="1261800"/>
+          </a:xfrm>
+          <a:prstGeom prst="rect">
+            <a:avLst/>
+          </a:prstGeom>
+        </p:spPr>
+        <p:txBody>
+          <a:bodyPr lIns="0" rIns="0" tIns="0" bIns="0" anchor="ctr"/>
+          <a:p>
+            <a:pPr algn="ctr"/>
+            <a:endParaRPr b="0" lang="en-US" sz="4400" spc="-1" strike="noStrike">
+              <a:solidFill>
+                <a:srgbClr val="000000"/>
+              </a:solidFill>
+              <a:uFill>
+                <a:solidFill>
+                  <a:srgbClr val="ffffff"/>
+                </a:solidFill>
+              </a:uFill>
+              <a:latin typeface="Arial"/>
+            </a:endParaRPr>
+          </a:p>
+        </p:txBody>
+      </p:sp>
+      <p:sp>
+        <p:nvSpPr>
+          <p:cNvPr id="68" name="PlaceHolder 2"/>
+          <p:cNvSpPr>
+            <a:spLocks noGrp="1"/>
+          </p:cNvSpPr>
+          <p:nvPr>
+            <p:ph type="body"/>
+          </p:nvPr>
+        </p:nvSpPr>
+        <p:spPr>
+          <a:xfrm>
+            <a:off x="504000" y="1769040"/>
+            <a:ext cx="9071280" cy="4384080"/>
+          </a:xfrm>
+          <a:prstGeom prst="rect">
+            <a:avLst/>
+          </a:prstGeom>
+        </p:spPr>
+        <p:txBody>
+          <a:bodyPr lIns="0" rIns="0" tIns="0" bIns="0"/>
+          <a:p>
+            <a:endParaRPr b="0" lang="en-US" sz="3200" spc="-1" strike="noStrike">
+              <a:solidFill>
+                <a:srgbClr val="000000"/>
+              </a:solidFill>
+              <a:uFill>
+                <a:solidFill>
+                  <a:srgbClr val="ffffff"/>
+                </a:solidFill>
+              </a:uFill>
+              <a:latin typeface="Arial"/>
+            </a:endParaRPr>
+          </a:p>
+        </p:txBody>
+      </p:sp>
+      <p:sp>
+        <p:nvSpPr>
+          <p:cNvPr id="69" name="PlaceHolder 3"/>
+          <p:cNvSpPr>
+            <a:spLocks noGrp="1"/>
+          </p:cNvSpPr>
+          <p:nvPr>
+            <p:ph type="body"/>
+          </p:nvPr>
+        </p:nvSpPr>
+        <p:spPr>
+          <a:xfrm>
+            <a:off x="504000" y="1769040"/>
+            <a:ext cx="9071280" cy="4384080"/>
+          </a:xfrm>
+          <a:prstGeom prst="rect">
+            <a:avLst/>
+          </a:prstGeom>
+        </p:spPr>
+        <p:txBody>
+          <a:bodyPr lIns="0" rIns="0" tIns="0" bIns="0"/>
+          <a:p>
+            <a:endParaRPr b="0" lang="en-US" sz="3200" spc="-1" strike="noStrike">
+              <a:solidFill>
+                <a:srgbClr val="000000"/>
+              </a:solidFill>
+              <a:uFill>
+                <a:solidFill>
+                  <a:srgbClr val="ffffff"/>
+                </a:solidFill>
+              </a:uFill>
+              <a:latin typeface="Arial"/>
+            </a:endParaRPr>
+          </a:p>
+        </p:txBody>
+      </p:sp>
+      <p:pic>
+        <p:nvPicPr>
+          <p:cNvPr id="70" name="" descr=""/>
+          <p:cNvPicPr/>
+          <p:nvPr/>
+        </p:nvPicPr>
+        <p:blipFill>
+          <a:blip r:embed="rId2"/>
+          <a:stretch/>
+        </p:blipFill>
+        <p:spPr>
+          <a:xfrm>
+            <a:off x="2292120" y="1769040"/>
+            <a:ext cx="5494680" cy="4384080"/>
+          </a:xfrm>
+          <a:prstGeom prst="rect">
+            <a:avLst/>
+          </a:prstGeom>
+          <a:ln>
+            <a:noFill/>
+          </a:ln>
+        </p:spPr>
+      </p:pic>
+      <p:pic>
+        <p:nvPicPr>
+          <p:cNvPr id="71" name="" descr=""/>
+          <p:cNvPicPr/>
+          <p:nvPr/>
+        </p:nvPicPr>
+        <p:blipFill>
+          <a:blip r:embed="rId3"/>
+          <a:stretch/>
+        </p:blipFill>
+        <p:spPr>
+          <a:xfrm>
+            <a:off x="2292120" y="1769040"/>
+            <a:ext cx="5494680" cy="4384080"/>
+          </a:xfrm>
+          <a:prstGeom prst="rect">
+            <a:avLst/>
+          </a:prstGeom>
+          <a:ln>
+            <a:noFill/>
+          </a:ln>
+        </p:spPr>
+      </p:pic>
     </p:spTree>
   </p:cSld>
 </p:sldLayout>
@@ -665,7 +2143,7 @@
       </p:grpSpPr>
       <p:sp>
         <p:nvSpPr>
-          <p:cNvPr id="7" name="PlaceHolder 1"/>
+          <p:cNvPr id="4" name="PlaceHolder 1"/>
           <p:cNvSpPr>
             <a:spLocks noGrp="1"/>
           </p:cNvSpPr>
@@ -676,7 +2154,7 @@
         <p:spPr>
           <a:xfrm>
             <a:off x="504000" y="301320"/>
-            <a:ext cx="9071640" cy="1262160"/>
+            <a:ext cx="9071280" cy="1261800"/>
           </a:xfrm>
           <a:prstGeom prst="rect">
             <a:avLst/>
@@ -702,7 +2180,7 @@
       </p:sp>
       <p:sp>
         <p:nvSpPr>
-          <p:cNvPr id="8" name="PlaceHolder 2"/>
+          <p:cNvPr id="5" name="PlaceHolder 2"/>
           <p:cNvSpPr>
             <a:spLocks noGrp="1"/>
           </p:cNvSpPr>
@@ -713,7 +2191,7 @@
         <p:spPr>
           <a:xfrm>
             <a:off x="504000" y="1769040"/>
-            <a:ext cx="9071640" cy="4384440"/>
+            <a:ext cx="9071280" cy="4384080"/>
           </a:xfrm>
           <a:prstGeom prst="rect">
             <a:avLst/>
@@ -760,7 +2238,7 @@
       </p:grpSpPr>
       <p:sp>
         <p:nvSpPr>
-          <p:cNvPr id="9" name="PlaceHolder 1"/>
+          <p:cNvPr id="6" name="PlaceHolder 1"/>
           <p:cNvSpPr>
             <a:spLocks noGrp="1"/>
           </p:cNvSpPr>
@@ -771,7 +2249,7 @@
         <p:spPr>
           <a:xfrm>
             <a:off x="504000" y="301320"/>
-            <a:ext cx="9071640" cy="1262160"/>
+            <a:ext cx="9071280" cy="1261800"/>
           </a:xfrm>
           <a:prstGeom prst="rect">
             <a:avLst/>
@@ -797,7 +2275,7 @@
       </p:sp>
       <p:sp>
         <p:nvSpPr>
-          <p:cNvPr id="10" name="PlaceHolder 2"/>
+          <p:cNvPr id="7" name="PlaceHolder 2"/>
           <p:cNvSpPr>
             <a:spLocks noGrp="1"/>
           </p:cNvSpPr>
@@ -808,7 +2286,7 @@
         <p:spPr>
           <a:xfrm>
             <a:off x="504000" y="1769040"/>
-            <a:ext cx="4426920" cy="4384440"/>
+            <a:ext cx="4426560" cy="4384080"/>
           </a:xfrm>
           <a:prstGeom prst="rect">
             <a:avLst/>
@@ -833,7 +2311,7 @@
       </p:sp>
       <p:sp>
         <p:nvSpPr>
-          <p:cNvPr id="11" name="PlaceHolder 3"/>
+          <p:cNvPr id="8" name="PlaceHolder 3"/>
           <p:cNvSpPr>
             <a:spLocks noGrp="1"/>
           </p:cNvSpPr>
@@ -843,8 +2321,8 @@
         </p:nvSpPr>
         <p:spPr>
           <a:xfrm>
-            <a:off x="5152680" y="1769040"/>
-            <a:ext cx="4426920" cy="4384440"/>
+            <a:off x="5152320" y="1769040"/>
+            <a:ext cx="4426560" cy="4384080"/>
           </a:xfrm>
           <a:prstGeom prst="rect">
             <a:avLst/>
@@ -891,7 +2369,7 @@
       </p:grpSpPr>
       <p:sp>
         <p:nvSpPr>
-          <p:cNvPr id="12" name="PlaceHolder 1"/>
+          <p:cNvPr id="9" name="PlaceHolder 1"/>
           <p:cNvSpPr>
             <a:spLocks noGrp="1"/>
           </p:cNvSpPr>
@@ -902,7 +2380,7 @@
         <p:spPr>
           <a:xfrm>
             <a:off x="504000" y="301320"/>
-            <a:ext cx="9071640" cy="1262160"/>
+            <a:ext cx="9071280" cy="1261800"/>
           </a:xfrm>
           <a:prstGeom prst="rect">
             <a:avLst/>
@@ -950,7 +2428,7 @@
       </p:grpSpPr>
       <p:sp>
         <p:nvSpPr>
-          <p:cNvPr id="13" name="PlaceHolder 1"/>
+          <p:cNvPr id="10" name="PlaceHolder 1"/>
           <p:cNvSpPr>
             <a:spLocks noGrp="1"/>
           </p:cNvSpPr>
@@ -961,7 +2439,7 @@
         <p:spPr>
           <a:xfrm>
             <a:off x="504000" y="301320"/>
-            <a:ext cx="9071640" cy="5851800"/>
+            <a:ext cx="9071280" cy="5850360"/>
           </a:xfrm>
           <a:prstGeom prst="rect">
             <a:avLst/>
@@ -1009,7 +2487,7 @@
       </p:grpSpPr>
       <p:sp>
         <p:nvSpPr>
-          <p:cNvPr id="14" name="PlaceHolder 1"/>
+          <p:cNvPr id="11" name="PlaceHolder 1"/>
           <p:cNvSpPr>
             <a:spLocks noGrp="1"/>
           </p:cNvSpPr>
@@ -1020,7 +2498,7 @@
         <p:spPr>
           <a:xfrm>
             <a:off x="504000" y="301320"/>
-            <a:ext cx="9071640" cy="1262160"/>
+            <a:ext cx="9071280" cy="1261800"/>
           </a:xfrm>
           <a:prstGeom prst="rect">
             <a:avLst/>
@@ -1046,7 +2524,7 @@
       </p:sp>
       <p:sp>
         <p:nvSpPr>
-          <p:cNvPr id="15" name="PlaceHolder 2"/>
+          <p:cNvPr id="12" name="PlaceHolder 2"/>
           <p:cNvSpPr>
             <a:spLocks noGrp="1"/>
           </p:cNvSpPr>
@@ -1057,7 +2535,7 @@
         <p:spPr>
           <a:xfrm>
             <a:off x="504000" y="1769040"/>
-            <a:ext cx="4426920" cy="2091240"/>
+            <a:ext cx="4426560" cy="2090880"/>
           </a:xfrm>
           <a:prstGeom prst="rect">
             <a:avLst/>
@@ -1082,7 +2560,7 @@
       </p:sp>
       <p:sp>
         <p:nvSpPr>
-          <p:cNvPr id="16" name="PlaceHolder 3"/>
+          <p:cNvPr id="13" name="PlaceHolder 3"/>
           <p:cNvSpPr>
             <a:spLocks noGrp="1"/>
           </p:cNvSpPr>
@@ -1092,8 +2570,8 @@
         </p:nvSpPr>
         <p:spPr>
           <a:xfrm>
-            <a:off x="504000" y="4059360"/>
-            <a:ext cx="4426920" cy="2091240"/>
+            <a:off x="504000" y="4059000"/>
+            <a:ext cx="4426560" cy="2090880"/>
           </a:xfrm>
           <a:prstGeom prst="rect">
             <a:avLst/>
@@ -1118,7 +2596,7 @@
       </p:sp>
       <p:sp>
         <p:nvSpPr>
-          <p:cNvPr id="17" name="PlaceHolder 4"/>
+          <p:cNvPr id="14" name="PlaceHolder 4"/>
           <p:cNvSpPr>
             <a:spLocks noGrp="1"/>
           </p:cNvSpPr>
@@ -1128,8 +2606,8 @@
         </p:nvSpPr>
         <p:spPr>
           <a:xfrm>
-            <a:off x="5152680" y="1769040"/>
-            <a:ext cx="4426920" cy="4384440"/>
+            <a:off x="5152320" y="1769040"/>
+            <a:ext cx="4426560" cy="4384080"/>
           </a:xfrm>
           <a:prstGeom prst="rect">
             <a:avLst/>
@@ -1176,7 +2654,7 @@
       </p:grpSpPr>
       <p:sp>
         <p:nvSpPr>
-          <p:cNvPr id="18" name="PlaceHolder 1"/>
+          <p:cNvPr id="15" name="PlaceHolder 1"/>
           <p:cNvSpPr>
             <a:spLocks noGrp="1"/>
           </p:cNvSpPr>
@@ -1187,7 +2665,7 @@
         <p:spPr>
           <a:xfrm>
             <a:off x="504000" y="301320"/>
-            <a:ext cx="9071640" cy="1262160"/>
+            <a:ext cx="9071280" cy="1261800"/>
           </a:xfrm>
           <a:prstGeom prst="rect">
             <a:avLst/>
@@ -1213,7 +2691,7 @@
       </p:sp>
       <p:sp>
         <p:nvSpPr>
-          <p:cNvPr id="19" name="PlaceHolder 2"/>
+          <p:cNvPr id="16" name="PlaceHolder 2"/>
           <p:cNvSpPr>
             <a:spLocks noGrp="1"/>
           </p:cNvSpPr>
@@ -1224,7 +2702,7 @@
         <p:spPr>
           <a:xfrm>
             <a:off x="504000" y="1769040"/>
-            <a:ext cx="4426920" cy="4384440"/>
+            <a:ext cx="4426560" cy="4384080"/>
           </a:xfrm>
           <a:prstGeom prst="rect">
             <a:avLst/>
@@ -1249,7 +2727,7 @@
       </p:sp>
       <p:sp>
         <p:nvSpPr>
-          <p:cNvPr id="20" name="PlaceHolder 3"/>
+          <p:cNvPr id="17" name="PlaceHolder 3"/>
           <p:cNvSpPr>
             <a:spLocks noGrp="1"/>
           </p:cNvSpPr>
@@ -1259,8 +2737,8 @@
         </p:nvSpPr>
         <p:spPr>
           <a:xfrm>
-            <a:off x="5152680" y="1769040"/>
-            <a:ext cx="4426920" cy="2091240"/>
+            <a:off x="5152320" y="1769040"/>
+            <a:ext cx="4426560" cy="2090880"/>
           </a:xfrm>
           <a:prstGeom prst="rect">
             <a:avLst/>
@@ -1285,7 +2763,7 @@
       </p:sp>
       <p:sp>
         <p:nvSpPr>
-          <p:cNvPr id="21" name="PlaceHolder 4"/>
+          <p:cNvPr id="18" name="PlaceHolder 4"/>
           <p:cNvSpPr>
             <a:spLocks noGrp="1"/>
           </p:cNvSpPr>
@@ -1295,8 +2773,8 @@
         </p:nvSpPr>
         <p:spPr>
           <a:xfrm>
-            <a:off x="5152680" y="4059360"/>
-            <a:ext cx="4426920" cy="2091240"/>
+            <a:off x="5152320" y="4059000"/>
+            <a:ext cx="4426560" cy="2090880"/>
           </a:xfrm>
           <a:prstGeom prst="rect">
             <a:avLst/>
@@ -1343,7 +2821,7 @@
       </p:grpSpPr>
       <p:sp>
         <p:nvSpPr>
-          <p:cNvPr id="22" name="PlaceHolder 1"/>
+          <p:cNvPr id="19" name="PlaceHolder 1"/>
           <p:cNvSpPr>
             <a:spLocks noGrp="1"/>
           </p:cNvSpPr>
@@ -1354,7 +2832,7 @@
         <p:spPr>
           <a:xfrm>
             <a:off x="504000" y="301320"/>
-            <a:ext cx="9071640" cy="1262160"/>
+            <a:ext cx="9071280" cy="1261800"/>
           </a:xfrm>
           <a:prstGeom prst="rect">
             <a:avLst/>
@@ -1380,7 +2858,7 @@
       </p:sp>
       <p:sp>
         <p:nvSpPr>
-          <p:cNvPr id="23" name="PlaceHolder 2"/>
+          <p:cNvPr id="20" name="PlaceHolder 2"/>
           <p:cNvSpPr>
             <a:spLocks noGrp="1"/>
           </p:cNvSpPr>
@@ -1391,7 +2869,7 @@
         <p:spPr>
           <a:xfrm>
             <a:off x="504000" y="1769040"/>
-            <a:ext cx="4426920" cy="2091240"/>
+            <a:ext cx="4426560" cy="2090880"/>
           </a:xfrm>
           <a:prstGeom prst="rect">
             <a:avLst/>
@@ -1416,7 +2894,7 @@
       </p:sp>
       <p:sp>
         <p:nvSpPr>
-          <p:cNvPr id="24" name="PlaceHolder 3"/>
+          <p:cNvPr id="21" name="PlaceHolder 3"/>
           <p:cNvSpPr>
             <a:spLocks noGrp="1"/>
           </p:cNvSpPr>
@@ -1426,8 +2904,8 @@
         </p:nvSpPr>
         <p:spPr>
           <a:xfrm>
-            <a:off x="5152680" y="1769040"/>
-            <a:ext cx="4426920" cy="2091240"/>
+            <a:off x="5152320" y="1769040"/>
+            <a:ext cx="4426560" cy="2090880"/>
           </a:xfrm>
           <a:prstGeom prst="rect">
             <a:avLst/>
@@ -1452,7 +2930,7 @@
       </p:sp>
       <p:sp>
         <p:nvSpPr>
-          <p:cNvPr id="25" name="PlaceHolder 4"/>
+          <p:cNvPr id="22" name="PlaceHolder 4"/>
           <p:cNvSpPr>
             <a:spLocks noGrp="1"/>
           </p:cNvSpPr>
@@ -1462,8 +2940,8 @@
         </p:nvSpPr>
         <p:spPr>
           <a:xfrm>
-            <a:off x="504000" y="4059360"/>
-            <a:ext cx="9071640" cy="2091240"/>
+            <a:off x="504000" y="4059000"/>
+            <a:ext cx="9071280" cy="2090880"/>
           </a:xfrm>
           <a:prstGeom prst="rect">
             <a:avLst/>
@@ -1521,7 +2999,7 @@
         <p:spPr>
           <a:xfrm>
             <a:off x="504000" y="301320"/>
-            <a:ext cx="9071640" cy="1262160"/>
+            <a:ext cx="9071280" cy="1261800"/>
           </a:xfrm>
           <a:prstGeom prst="rect">
             <a:avLst/>
@@ -1531,20 +3009,6 @@
           <a:bodyPr lIns="0" rIns="0" tIns="0" bIns="0" anchor="ctr"/>
           <a:p>
             <a:pPr algn="ctr"/>
-            <a:r>
-              <a:rPr b="0" lang="en-US" sz="4400" spc="-1" strike="noStrike">
-                <a:solidFill>
-                  <a:srgbClr val="000000"/>
-                </a:solidFill>
-                <a:uFill>
-                  <a:solidFill>
-                    <a:srgbClr val="ffffff"/>
-                  </a:solidFill>
-                </a:uFill>
-                <a:latin typeface="Arial"/>
-              </a:rPr>
-              <a:t>Click to edit the title text format</a:t>
-            </a:r>
             <a:endParaRPr b="0" lang="en-US" sz="4400" spc="-1" strike="noStrike">
               <a:solidFill>
                 <a:srgbClr val="000000"/>
@@ -1571,8 +3035,8 @@
         </p:nvSpPr>
         <p:spPr>
           <a:xfrm>
-            <a:off x="504000" y="1769040"/>
-            <a:ext cx="9071640" cy="4384440"/>
+            <a:off x="504000" y="1768680"/>
+            <a:ext cx="9072000" cy="4384080"/>
           </a:xfrm>
           <a:prstGeom prst="rect">
             <a:avLst/>
@@ -1823,158 +3287,6 @@
                 </a:solidFill>
               </a:uFill>
               <a:latin typeface="Arial"/>
-            </a:endParaRPr>
-          </a:p>
-        </p:txBody>
-      </p:sp>
-      <p:sp>
-        <p:nvSpPr>
-          <p:cNvPr id="2" name="PlaceHolder 3"/>
-          <p:cNvSpPr>
-            <a:spLocks noGrp="1"/>
-          </p:cNvSpPr>
-          <p:nvPr>
-            <p:ph type="dt"/>
-          </p:nvPr>
-        </p:nvSpPr>
-        <p:spPr>
-          <a:xfrm>
-            <a:off x="504000" y="6887160"/>
-            <a:ext cx="2348280" cy="521280"/>
-          </a:xfrm>
-          <a:prstGeom prst="rect">
-            <a:avLst/>
-          </a:prstGeom>
-        </p:spPr>
-        <p:txBody>
-          <a:bodyPr lIns="0" rIns="0" tIns="0" bIns="0"/>
-          <a:p>
-            <a:r>
-              <a:rPr b="0" lang="en-US" sz="1400" spc="-1" strike="noStrike">
-                <a:solidFill>
-                  <a:srgbClr val="000000"/>
-                </a:solidFill>
-                <a:uFill>
-                  <a:solidFill>
-                    <a:srgbClr val="ffffff"/>
-                  </a:solidFill>
-                </a:uFill>
-                <a:latin typeface="Times New Roman"/>
-              </a:rPr>
-              <a:t>&lt;date/time&gt;</a:t>
-            </a:r>
-            <a:endParaRPr b="0" lang="en-US" sz="1400" spc="-1" strike="noStrike">
-              <a:solidFill>
-                <a:srgbClr val="000000"/>
-              </a:solidFill>
-              <a:uFill>
-                <a:solidFill>
-                  <a:srgbClr val="ffffff"/>
-                </a:solidFill>
-              </a:uFill>
-              <a:latin typeface="Times New Roman"/>
-            </a:endParaRPr>
-          </a:p>
-        </p:txBody>
-      </p:sp>
-      <p:sp>
-        <p:nvSpPr>
-          <p:cNvPr id="3" name="PlaceHolder 4"/>
-          <p:cNvSpPr>
-            <a:spLocks noGrp="1"/>
-          </p:cNvSpPr>
-          <p:nvPr>
-            <p:ph type="ftr"/>
-          </p:nvPr>
-        </p:nvSpPr>
-        <p:spPr>
-          <a:xfrm>
-            <a:off x="3447360" y="6887160"/>
-            <a:ext cx="3195000" cy="521280"/>
-          </a:xfrm>
-          <a:prstGeom prst="rect">
-            <a:avLst/>
-          </a:prstGeom>
-        </p:spPr>
-        <p:txBody>
-          <a:bodyPr lIns="0" rIns="0" tIns="0" bIns="0"/>
-          <a:p>
-            <a:pPr algn="ctr"/>
-            <a:r>
-              <a:rPr b="0" lang="en-US" sz="1400" spc="-1" strike="noStrike">
-                <a:solidFill>
-                  <a:srgbClr val="000000"/>
-                </a:solidFill>
-                <a:uFill>
-                  <a:solidFill>
-                    <a:srgbClr val="ffffff"/>
-                  </a:solidFill>
-                </a:uFill>
-                <a:latin typeface="Times New Roman"/>
-              </a:rPr>
-              <a:t>&lt;footer&gt;</a:t>
-            </a:r>
-            <a:endParaRPr b="0" lang="en-US" sz="1400" spc="-1" strike="noStrike">
-              <a:solidFill>
-                <a:srgbClr val="000000"/>
-              </a:solidFill>
-              <a:uFill>
-                <a:solidFill>
-                  <a:srgbClr val="ffffff"/>
-                </a:solidFill>
-              </a:uFill>
-              <a:latin typeface="Times New Roman"/>
-            </a:endParaRPr>
-          </a:p>
-        </p:txBody>
-      </p:sp>
-      <p:sp>
-        <p:nvSpPr>
-          <p:cNvPr id="4" name="PlaceHolder 5"/>
-          <p:cNvSpPr>
-            <a:spLocks noGrp="1"/>
-          </p:cNvSpPr>
-          <p:nvPr>
-            <p:ph type="sldNum"/>
-          </p:nvPr>
-        </p:nvSpPr>
-        <p:spPr>
-          <a:xfrm>
-            <a:off x="7227360" y="6887160"/>
-            <a:ext cx="2348280" cy="521280"/>
-          </a:xfrm>
-          <a:prstGeom prst="rect">
-            <a:avLst/>
-          </a:prstGeom>
-        </p:spPr>
-        <p:txBody>
-          <a:bodyPr lIns="0" rIns="0" tIns="0" bIns="0"/>
-          <a:p>
-            <a:pPr algn="r"/>
-            <a:fld id="{A7ED1EC0-D8AE-4144-9196-35E17BDC85E1}" type="slidenum">
-              <a:rPr b="0" lang="en-US" sz="1400" spc="-1" strike="noStrike">
-                <a:solidFill>
-                  <a:srgbClr val="000000"/>
-                </a:solidFill>
-                <a:uFill>
-                  <a:solidFill>
-                    <a:srgbClr val="ffffff"/>
-                  </a:solidFill>
-                </a:uFill>
-                <a:latin typeface="Times New Roman"/>
-              </a:rPr>
-              <a:t>&lt;number&gt;</a:t>
-            </a:fld>
-            <a:endParaRPr b="0" lang="en-US" sz="1400" spc="-1" strike="noStrike">
-              <a:solidFill>
-                <a:srgbClr val="000000"/>
-              </a:solidFill>
-              <a:uFill>
-                <a:solidFill>
-                  <a:srgbClr val="ffffff"/>
-                </a:solidFill>
-              </a:uFill>
-              <a:latin typeface="Times New Roman"/>
             </a:endParaRPr>
           </a:p>
         </p:txBody>
@@ -1995,6 +3307,348 @@
     <p:sldLayoutId id="2147483658" r:id="rId11"/>
     <p:sldLayoutId id="2147483659" r:id="rId12"/>
     <p:sldLayoutId id="2147483660" r:id="rId13"/>
+  </p:sldLayoutIdLst>
+</p:sldMaster>
+</file>
+
+<file path=ppt/slideMasters/slideMaster2.xml><?xml version="1.0" encoding="utf-8"?>
+<p:sldMaster xmlns:a="http://schemas.openxmlformats.org/drawingml/2006/main" xmlns:p="http://schemas.openxmlformats.org/presentationml/2006/main" xmlns:r="http://schemas.openxmlformats.org/officeDocument/2006/relationships" xmlns:p14="http://schemas.microsoft.com/office/powerpoint/2010/main" xmlns:p15="http://schemas.microsoft.com/office/powerpoint/2012/main" xmlns:mc="http://schemas.openxmlformats.org/markup-compatibility/2006">
+  <p:cSld>
+    <p:spTree>
+      <p:nvGrpSpPr>
+        <p:cNvPr id="1" name=""/>
+        <p:cNvGrpSpPr/>
+        <p:nvPr/>
+      </p:nvGrpSpPr>
+      <p:grpSpPr>
+        <a:xfrm>
+          <a:off x="0" y="0"/>
+          <a:ext cx="0" cy="0"/>
+          <a:chOff x="0" y="0"/>
+          <a:chExt cx="0" cy="0"/>
+        </a:xfrm>
+      </p:grpSpPr>
+      <p:sp>
+        <p:nvSpPr>
+          <p:cNvPr id="36" name="PlaceHolder 1"/>
+          <p:cNvSpPr>
+            <a:spLocks noGrp="1"/>
+          </p:cNvSpPr>
+          <p:nvPr>
+            <p:ph type="title"/>
+          </p:nvPr>
+        </p:nvSpPr>
+        <p:spPr>
+          <a:xfrm>
+            <a:off x="504000" y="301320"/>
+            <a:ext cx="9071280" cy="1261800"/>
+          </a:xfrm>
+          <a:prstGeom prst="rect">
+            <a:avLst/>
+          </a:prstGeom>
+        </p:spPr>
+        <p:txBody>
+          <a:bodyPr lIns="0" rIns="0" tIns="0" bIns="0" anchor="ctr"/>
+          <a:p>
+            <a:pPr algn="ctr"/>
+            <a:endParaRPr b="0" lang="en-US" sz="4400" spc="-1" strike="noStrike">
+              <a:solidFill>
+                <a:srgbClr val="000000"/>
+              </a:solidFill>
+              <a:uFill>
+                <a:solidFill>
+                  <a:srgbClr val="ffffff"/>
+                </a:solidFill>
+              </a:uFill>
+              <a:latin typeface="Arial"/>
+            </a:endParaRPr>
+          </a:p>
+        </p:txBody>
+      </p:sp>
+      <p:sp>
+        <p:nvSpPr>
+          <p:cNvPr id="37" name="PlaceHolder 2"/>
+          <p:cNvSpPr>
+            <a:spLocks noGrp="1"/>
+          </p:cNvSpPr>
+          <p:nvPr>
+            <p:ph type="body"/>
+          </p:nvPr>
+        </p:nvSpPr>
+        <p:spPr>
+          <a:xfrm>
+            <a:off x="504000" y="1769040"/>
+            <a:ext cx="9071280" cy="4384080"/>
+          </a:xfrm>
+          <a:prstGeom prst="rect">
+            <a:avLst/>
+          </a:prstGeom>
+        </p:spPr>
+        <p:txBody>
+          <a:bodyPr lIns="0" rIns="0" tIns="0" bIns="0"/>
+          <a:p>
+            <a:pPr marL="432000" indent="-324000">
+              <a:buClr>
+                <a:srgbClr val="000000"/>
+              </a:buClr>
+              <a:buSzPct val="45000"/>
+              <a:buFont typeface="Wingdings" charset="2"/>
+              <a:buChar char=""/>
+            </a:pPr>
+            <a:r>
+              <a:rPr b="0" lang="en-US" sz="1800" spc="-1" strike="noStrike">
+                <a:solidFill>
+                  <a:srgbClr val="000000"/>
+                </a:solidFill>
+                <a:uFill>
+                  <a:solidFill>
+                    <a:srgbClr val="ffffff"/>
+                  </a:solidFill>
+                </a:uFill>
+                <a:latin typeface="Arial"/>
+              </a:rPr>
+              <a:t>Click to edit the outline text format</a:t>
+            </a:r>
+            <a:endParaRPr b="0" lang="en-US" sz="1800" spc="-1" strike="noStrike">
+              <a:solidFill>
+                <a:srgbClr val="000000"/>
+              </a:solidFill>
+              <a:uFill>
+                <a:solidFill>
+                  <a:srgbClr val="ffffff"/>
+                </a:solidFill>
+              </a:uFill>
+              <a:latin typeface="Arial"/>
+            </a:endParaRPr>
+          </a:p>
+          <a:p>
+            <a:pPr lvl="1" marL="864000" indent="-324000">
+              <a:buClr>
+                <a:srgbClr val="000000"/>
+              </a:buClr>
+              <a:buSzPct val="75000"/>
+              <a:buFont typeface="Symbol" charset="2"/>
+              <a:buChar char=""/>
+            </a:pPr>
+            <a:r>
+              <a:rPr b="0" lang="en-US" sz="1800" spc="-1" strike="noStrike">
+                <a:solidFill>
+                  <a:srgbClr val="000000"/>
+                </a:solidFill>
+                <a:uFill>
+                  <a:solidFill>
+                    <a:srgbClr val="ffffff"/>
+                  </a:solidFill>
+                </a:uFill>
+                <a:latin typeface="Arial"/>
+              </a:rPr>
+              <a:t>Second Outline Level</a:t>
+            </a:r>
+            <a:endParaRPr b="0" lang="en-US" sz="1800" spc="-1" strike="noStrike">
+              <a:solidFill>
+                <a:srgbClr val="000000"/>
+              </a:solidFill>
+              <a:uFill>
+                <a:solidFill>
+                  <a:srgbClr val="ffffff"/>
+                </a:solidFill>
+              </a:uFill>
+              <a:latin typeface="Arial"/>
+            </a:endParaRPr>
+          </a:p>
+          <a:p>
+            <a:pPr lvl="2" marL="1296000" indent="-288000">
+              <a:buClr>
+                <a:srgbClr val="000000"/>
+              </a:buClr>
+              <a:buSzPct val="45000"/>
+              <a:buFont typeface="Wingdings" charset="2"/>
+              <a:buChar char=""/>
+            </a:pPr>
+            <a:r>
+              <a:rPr b="0" lang="en-US" sz="1800" spc="-1" strike="noStrike">
+                <a:solidFill>
+                  <a:srgbClr val="000000"/>
+                </a:solidFill>
+                <a:uFill>
+                  <a:solidFill>
+                    <a:srgbClr val="ffffff"/>
+                  </a:solidFill>
+                </a:uFill>
+                <a:latin typeface="Arial"/>
+              </a:rPr>
+              <a:t>Third Outline Level</a:t>
+            </a:r>
+            <a:endParaRPr b="0" lang="en-US" sz="1800" spc="-1" strike="noStrike">
+              <a:solidFill>
+                <a:srgbClr val="000000"/>
+              </a:solidFill>
+              <a:uFill>
+                <a:solidFill>
+                  <a:srgbClr val="ffffff"/>
+                </a:solidFill>
+              </a:uFill>
+              <a:latin typeface="Arial"/>
+            </a:endParaRPr>
+          </a:p>
+          <a:p>
+            <a:pPr lvl="3" marL="1728000" indent="-216000">
+              <a:buClr>
+                <a:srgbClr val="000000"/>
+              </a:buClr>
+              <a:buSzPct val="75000"/>
+              <a:buFont typeface="Symbol" charset="2"/>
+              <a:buChar char=""/>
+            </a:pPr>
+            <a:r>
+              <a:rPr b="0" lang="en-US" sz="1800" spc="-1" strike="noStrike">
+                <a:solidFill>
+                  <a:srgbClr val="000000"/>
+                </a:solidFill>
+                <a:uFill>
+                  <a:solidFill>
+                    <a:srgbClr val="ffffff"/>
+                  </a:solidFill>
+                </a:uFill>
+                <a:latin typeface="Arial"/>
+              </a:rPr>
+              <a:t>Fourth Outline Level</a:t>
+            </a:r>
+            <a:endParaRPr b="0" lang="en-US" sz="1800" spc="-1" strike="noStrike">
+              <a:solidFill>
+                <a:srgbClr val="000000"/>
+              </a:solidFill>
+              <a:uFill>
+                <a:solidFill>
+                  <a:srgbClr val="ffffff"/>
+                </a:solidFill>
+              </a:uFill>
+              <a:latin typeface="Arial"/>
+            </a:endParaRPr>
+          </a:p>
+          <a:p>
+            <a:pPr lvl="4" marL="2160000" indent="-216000">
+              <a:buClr>
+                <a:srgbClr val="000000"/>
+              </a:buClr>
+              <a:buSzPct val="45000"/>
+              <a:buFont typeface="Wingdings" charset="2"/>
+              <a:buChar char=""/>
+            </a:pPr>
+            <a:r>
+              <a:rPr b="0" lang="en-US" sz="1800" spc="-1" strike="noStrike">
+                <a:solidFill>
+                  <a:srgbClr val="000000"/>
+                </a:solidFill>
+                <a:uFill>
+                  <a:solidFill>
+                    <a:srgbClr val="ffffff"/>
+                  </a:solidFill>
+                </a:uFill>
+                <a:latin typeface="Arial"/>
+              </a:rPr>
+              <a:t>Fifth Outline Level</a:t>
+            </a:r>
+            <a:endParaRPr b="0" lang="en-US" sz="1800" spc="-1" strike="noStrike">
+              <a:solidFill>
+                <a:srgbClr val="000000"/>
+              </a:solidFill>
+              <a:uFill>
+                <a:solidFill>
+                  <a:srgbClr val="ffffff"/>
+                </a:solidFill>
+              </a:uFill>
+              <a:latin typeface="Arial"/>
+            </a:endParaRPr>
+          </a:p>
+          <a:p>
+            <a:pPr lvl="5" marL="2592000" indent="-216000">
+              <a:buClr>
+                <a:srgbClr val="000000"/>
+              </a:buClr>
+              <a:buSzPct val="45000"/>
+              <a:buFont typeface="Wingdings" charset="2"/>
+              <a:buChar char=""/>
+            </a:pPr>
+            <a:r>
+              <a:rPr b="0" lang="en-US" sz="1800" spc="-1" strike="noStrike">
+                <a:solidFill>
+                  <a:srgbClr val="000000"/>
+                </a:solidFill>
+                <a:uFill>
+                  <a:solidFill>
+                    <a:srgbClr val="ffffff"/>
+                  </a:solidFill>
+                </a:uFill>
+                <a:latin typeface="Arial"/>
+              </a:rPr>
+              <a:t>Sixth Outline Level</a:t>
+            </a:r>
+            <a:endParaRPr b="0" lang="en-US" sz="1800" spc="-1" strike="noStrike">
+              <a:solidFill>
+                <a:srgbClr val="000000"/>
+              </a:solidFill>
+              <a:uFill>
+                <a:solidFill>
+                  <a:srgbClr val="ffffff"/>
+                </a:solidFill>
+              </a:uFill>
+              <a:latin typeface="Arial"/>
+            </a:endParaRPr>
+          </a:p>
+          <a:p>
+            <a:pPr lvl="6" marL="3024000" indent="-216000">
+              <a:buClr>
+                <a:srgbClr val="000000"/>
+              </a:buClr>
+              <a:buSzPct val="45000"/>
+              <a:buFont typeface="Wingdings" charset="2"/>
+              <a:buChar char=""/>
+            </a:pPr>
+            <a:r>
+              <a:rPr b="0" lang="en-US" sz="1800" spc="-1" strike="noStrike">
+                <a:solidFill>
+                  <a:srgbClr val="000000"/>
+                </a:solidFill>
+                <a:uFill>
+                  <a:solidFill>
+                    <a:srgbClr val="ffffff"/>
+                  </a:solidFill>
+                </a:uFill>
+                <a:latin typeface="Arial"/>
+              </a:rPr>
+              <a:t>Seventh Outline Level</a:t>
+            </a:r>
+            <a:endParaRPr b="0" lang="en-US" sz="1800" spc="-1" strike="noStrike">
+              <a:solidFill>
+                <a:srgbClr val="000000"/>
+              </a:solidFill>
+              <a:uFill>
+                <a:solidFill>
+                  <a:srgbClr val="ffffff"/>
+                </a:solidFill>
+              </a:uFill>
+              <a:latin typeface="Arial"/>
+            </a:endParaRPr>
+          </a:p>
+        </p:txBody>
+      </p:sp>
+    </p:spTree>
+  </p:cSld>
+  <p:clrMap bg1="lt1" bg2="lt2" tx1="dk1" tx2="dk2" accent1="accent1" accent2="accent2" accent3="accent3" accent4="accent4" accent5="accent5" accent6="accent6" hlink="hlink" folHlink="folHlink"/>
+  <p:sldLayoutIdLst>
+    <p:sldLayoutId id="2147483662" r:id="rId2"/>
+    <p:sldLayoutId id="2147483663" r:id="rId3"/>
+    <p:sldLayoutId id="2147483664" r:id="rId4"/>
+    <p:sldLayoutId id="2147483665" r:id="rId5"/>
+    <p:sldLayoutId id="2147483666" r:id="rId6"/>
+    <p:sldLayoutId id="2147483667" r:id="rId7"/>
+    <p:sldLayoutId id="2147483668" r:id="rId8"/>
+    <p:sldLayoutId id="2147483669" r:id="rId9"/>
+    <p:sldLayoutId id="2147483670" r:id="rId10"/>
+    <p:sldLayoutId id="2147483671" r:id="rId11"/>
+    <p:sldLayoutId id="2147483672" r:id="rId12"/>
+    <p:sldLayoutId id="2147483673" r:id="rId13"/>
   </p:sldLayoutIdLst>
 </p:sldMaster>
 </file>
@@ -2018,14 +3672,14 @@
       </p:grpSpPr>
       <p:sp>
         <p:nvSpPr>
-          <p:cNvPr id="39" name="TextShape 1"/>
-          <p:cNvSpPr txBox="1"/>
+          <p:cNvPr id="72" name="CustomShape 1"/>
+          <p:cNvSpPr/>
           <p:nvPr/>
         </p:nvSpPr>
         <p:spPr>
           <a:xfrm>
             <a:off x="504000" y="301320"/>
-            <a:ext cx="9071640" cy="1262160"/>
+            <a:ext cx="9071280" cy="1261800"/>
           </a:xfrm>
           <a:prstGeom prst="rect">
             <a:avLst/>
@@ -2035,10 +3689,20 @@
             <a:noFill/>
           </a:ln>
         </p:spPr>
+        <p:style>
+          <a:lnRef idx="0"/>
+          <a:fillRef idx="0"/>
+          <a:effectRef idx="0"/>
+          <a:fontRef idx="minor"/>
+        </p:style>
         <p:txBody>
           <a:bodyPr lIns="0" rIns="0" tIns="0" bIns="0" anchor="ctr"/>
           <a:p>
-            <a:pPr algn="ctr"/>
+            <a:pPr algn="ctr">
+              <a:lnSpc>
+                <a:spcPct val="100000"/>
+              </a:lnSpc>
+            </a:pPr>
             <a:r>
               <a:rPr b="0" lang="en-US" sz="4400" spc="-1" strike="noStrike">
                 <a:solidFill>
@@ -2053,7 +3717,7 @@
               </a:rPr>
               <a:t>Tamagotchi</a:t>
             </a:r>
-            <a:endParaRPr b="0" lang="en-US" sz="4400" spc="-1" strike="noStrike">
+            <a:endParaRPr b="0" lang="en-US" sz="1800" spc="-1" strike="noStrike">
               <a:solidFill>
                 <a:srgbClr val="000000"/>
               </a:solidFill>
@@ -2069,7 +3733,7 @@
       </p:sp>
       <p:pic>
         <p:nvPicPr>
-          <p:cNvPr id="40" name="" descr=""/>
+          <p:cNvPr id="73" name="" descr=""/>
           <p:cNvPicPr/>
           <p:nvPr/>
         </p:nvPicPr>
@@ -2080,7 +3744,7 @@
         <p:spPr>
           <a:xfrm>
             <a:off x="91440" y="1472760"/>
-            <a:ext cx="4592160" cy="5385240"/>
+            <a:ext cx="4591800" cy="5384880"/>
           </a:xfrm>
           <a:prstGeom prst="rect">
             <a:avLst/>
@@ -2092,7 +3756,7 @@
       </p:pic>
       <p:pic>
         <p:nvPicPr>
-          <p:cNvPr id="41" name="" descr=""/>
+          <p:cNvPr id="74" name="" descr=""/>
           <p:cNvPicPr/>
           <p:nvPr/>
         </p:nvPicPr>
@@ -2104,7 +3768,7 @@
         <p:spPr>
           <a:xfrm>
             <a:off x="4023360" y="1371600"/>
-            <a:ext cx="2828880" cy="2925720"/>
+            <a:ext cx="2828520" cy="2925360"/>
           </a:xfrm>
           <a:prstGeom prst="rect">
             <a:avLst/>
@@ -2116,7 +3780,7 @@
       </p:pic>
       <p:pic>
         <p:nvPicPr>
-          <p:cNvPr id="42" name="" descr=""/>
+          <p:cNvPr id="75" name="" descr=""/>
           <p:cNvPicPr/>
           <p:nvPr/>
         </p:nvPicPr>
@@ -2127,7 +3791,7 @@
         <p:spPr>
           <a:xfrm>
             <a:off x="7132320" y="1371600"/>
-            <a:ext cx="2834640" cy="2901960"/>
+            <a:ext cx="2834280" cy="2901600"/>
           </a:xfrm>
           <a:prstGeom prst="rect">
             <a:avLst/>
@@ -2139,7 +3803,7 @@
       </p:pic>
       <p:pic>
         <p:nvPicPr>
-          <p:cNvPr id="43" name="" descr=""/>
+          <p:cNvPr id="76" name="" descr=""/>
           <p:cNvPicPr/>
           <p:nvPr/>
         </p:nvPicPr>
@@ -2150,7 +3814,7 @@
         <p:spPr>
           <a:xfrm>
             <a:off x="5577840" y="4296960"/>
-            <a:ext cx="2997360" cy="2981160"/>
+            <a:ext cx="2997000" cy="2980800"/>
           </a:xfrm>
           <a:prstGeom prst="rect">
             <a:avLst/>
@@ -2211,14 +3875,14 @@
       </p:grpSpPr>
       <p:sp>
         <p:nvSpPr>
-          <p:cNvPr id="44" name="TextShape 1"/>
-          <p:cNvSpPr txBox="1"/>
+          <p:cNvPr id="77" name="CustomShape 1"/>
+          <p:cNvSpPr/>
           <p:nvPr/>
         </p:nvSpPr>
         <p:spPr>
           <a:xfrm>
             <a:off x="504000" y="301320"/>
-            <a:ext cx="9071640" cy="1262160"/>
+            <a:ext cx="9071280" cy="1261800"/>
           </a:xfrm>
           <a:prstGeom prst="rect">
             <a:avLst/>
@@ -2228,10 +3892,20 @@
             <a:noFill/>
           </a:ln>
         </p:spPr>
+        <p:style>
+          <a:lnRef idx="0"/>
+          <a:fillRef idx="0"/>
+          <a:effectRef idx="0"/>
+          <a:fontRef idx="minor"/>
+        </p:style>
         <p:txBody>
           <a:bodyPr lIns="0" rIns="0" tIns="0" bIns="0" anchor="ctr"/>
           <a:p>
-            <a:pPr algn="ctr"/>
+            <a:pPr algn="ctr">
+              <a:lnSpc>
+                <a:spcPct val="100000"/>
+              </a:lnSpc>
+            </a:pPr>
             <a:r>
               <a:rPr b="0" lang="en-US" sz="4400" spc="-1" strike="noStrike">
                 <a:solidFill>
@@ -2246,30 +3920,30 @@
               </a:rPr>
               <a:t>Rules</a:t>
             </a:r>
-            <a:endParaRPr b="0" lang="en-US" sz="4400" spc="-1" strike="noStrike">
-              <a:solidFill>
-                <a:srgbClr val="000000"/>
-              </a:solidFill>
-              <a:uFill>
-                <a:solidFill>
-                  <a:srgbClr val="ffffff"/>
-                </a:solidFill>
-              </a:uFill>
-              <a:latin typeface="Arial"/>
-            </a:endParaRPr>
-          </a:p>
-        </p:txBody>
-      </p:sp>
-      <p:sp>
-        <p:nvSpPr>
-          <p:cNvPr id="45" name="TextShape 2"/>
-          <p:cNvSpPr txBox="1"/>
+            <a:endParaRPr b="0" lang="en-US" sz="1800" spc="-1" strike="noStrike">
+              <a:solidFill>
+                <a:srgbClr val="000000"/>
+              </a:solidFill>
+              <a:uFill>
+                <a:solidFill>
+                  <a:srgbClr val="ffffff"/>
+                </a:solidFill>
+              </a:uFill>
+              <a:latin typeface="Arial"/>
+            </a:endParaRPr>
+          </a:p>
+        </p:txBody>
+      </p:sp>
+      <p:sp>
+        <p:nvSpPr>
+          <p:cNvPr id="78" name="CustomShape 2"/>
+          <p:cNvSpPr/>
           <p:nvPr/>
         </p:nvSpPr>
         <p:spPr>
           <a:xfrm>
             <a:off x="504000" y="1769040"/>
-            <a:ext cx="9071640" cy="4384440"/>
+            <a:ext cx="9071280" cy="4384080"/>
           </a:xfrm>
           <a:prstGeom prst="rect">
             <a:avLst/>
@@ -2279,10 +3953,19 @@
             <a:noFill/>
           </a:ln>
         </p:spPr>
+        <p:style>
+          <a:lnRef idx="0"/>
+          <a:fillRef idx="0"/>
+          <a:effectRef idx="0"/>
+          <a:fontRef idx="minor"/>
+        </p:style>
         <p:txBody>
           <a:bodyPr lIns="0" rIns="0" tIns="0" bIns="0"/>
           <a:p>
-            <a:pPr marL="432000" indent="-324000">
+            <a:pPr marL="432000" indent="-323640">
+              <a:lnSpc>
+                <a:spcPct val="100000"/>
+              </a:lnSpc>
               <a:buClr>
                 <a:srgbClr val="000000"/>
               </a:buClr>
@@ -2291,7 +3974,7 @@
               <a:buChar char=""/>
             </a:pPr>
             <a:r>
-              <a:rPr b="0" lang="en-US" sz="3200" spc="-1" strike="noStrike">
+              <a:rPr b="0" lang="en-US" sz="3200" spc="299" strike="noStrike">
                 <a:solidFill>
                   <a:srgbClr val="000000"/>
                 </a:solidFill>
@@ -2304,20 +3987,24 @@
               </a:rPr>
               <a:t>Don’t let your pet die</a:t>
             </a:r>
-            <a:endParaRPr b="0" lang="en-US" sz="3200" spc="-1" strike="noStrike">
-              <a:solidFill>
-                <a:srgbClr val="000000"/>
-              </a:solidFill>
-              <a:uFill>
-                <a:solidFill>
-                  <a:srgbClr val="ffffff"/>
-                </a:solidFill>
-              </a:uFill>
-              <a:latin typeface="Arial"/>
-            </a:endParaRPr>
-          </a:p>
-          <a:p>
-            <a:pPr marL="432000" indent="-324000">
+            <a:endParaRPr b="0" lang="en-US" sz="1800" spc="299" strike="noStrike">
+              <a:solidFill>
+                <a:srgbClr val="000000"/>
+              </a:solidFill>
+              <a:uFill>
+                <a:solidFill>
+                  <a:srgbClr val="ffffff"/>
+                </a:solidFill>
+              </a:uFill>
+              <a:latin typeface="Arial"/>
+              <a:ea typeface="Noto Sans CJK SC Regular"/>
+            </a:endParaRPr>
+          </a:p>
+          <a:p>
+            <a:pPr marL="432000" indent="-323640">
+              <a:lnSpc>
+                <a:spcPct val="100000"/>
+              </a:lnSpc>
               <a:buClr>
                 <a:srgbClr val="000000"/>
               </a:buClr>
@@ -2326,7 +4013,7 @@
               <a:buChar char=""/>
             </a:pPr>
             <a:r>
-              <a:rPr b="0" lang="en-US" sz="3200" spc="-1" strike="noStrike">
+              <a:rPr b="0" lang="en-US" sz="3200" spc="299" strike="noStrike">
                 <a:solidFill>
                   <a:srgbClr val="000000"/>
                 </a:solidFill>
@@ -2339,20 +4026,24 @@
               </a:rPr>
               <a:t>Feed your pet</a:t>
             </a:r>
-            <a:endParaRPr b="0" lang="en-US" sz="3200" spc="-1" strike="noStrike">
-              <a:solidFill>
-                <a:srgbClr val="000000"/>
-              </a:solidFill>
-              <a:uFill>
-                <a:solidFill>
-                  <a:srgbClr val="ffffff"/>
-                </a:solidFill>
-              </a:uFill>
-              <a:latin typeface="Arial"/>
-            </a:endParaRPr>
-          </a:p>
-          <a:p>
-            <a:pPr marL="432000" indent="-324000">
+            <a:endParaRPr b="0" lang="en-US" sz="1800" spc="299" strike="noStrike">
+              <a:solidFill>
+                <a:srgbClr val="000000"/>
+              </a:solidFill>
+              <a:uFill>
+                <a:solidFill>
+                  <a:srgbClr val="ffffff"/>
+                </a:solidFill>
+              </a:uFill>
+              <a:latin typeface="Arial"/>
+              <a:ea typeface="Noto Sans CJK SC Regular"/>
+            </a:endParaRPr>
+          </a:p>
+          <a:p>
+            <a:pPr marL="432000" indent="-323640">
+              <a:lnSpc>
+                <a:spcPct val="100000"/>
+              </a:lnSpc>
               <a:buClr>
                 <a:srgbClr val="000000"/>
               </a:buClr>
@@ -2361,7 +4052,7 @@
               <a:buChar char=""/>
             </a:pPr>
             <a:r>
-              <a:rPr b="0" lang="en-US" sz="3200" spc="-1" strike="noStrike">
+              <a:rPr b="0" lang="en-US" sz="3200" spc="299" strike="noStrike">
                 <a:solidFill>
                   <a:srgbClr val="000000"/>
                 </a:solidFill>
@@ -2374,20 +4065,24 @@
               </a:rPr>
               <a:t>Don’t let your pet die</a:t>
             </a:r>
-            <a:endParaRPr b="0" lang="en-US" sz="3200" spc="-1" strike="noStrike">
-              <a:solidFill>
-                <a:srgbClr val="000000"/>
-              </a:solidFill>
-              <a:uFill>
-                <a:solidFill>
-                  <a:srgbClr val="ffffff"/>
-                </a:solidFill>
-              </a:uFill>
-              <a:latin typeface="Arial"/>
-            </a:endParaRPr>
-          </a:p>
-          <a:p>
-            <a:pPr marL="432000" indent="-324000">
+            <a:endParaRPr b="0" lang="en-US" sz="1800" spc="299" strike="noStrike">
+              <a:solidFill>
+                <a:srgbClr val="000000"/>
+              </a:solidFill>
+              <a:uFill>
+                <a:solidFill>
+                  <a:srgbClr val="ffffff"/>
+                </a:solidFill>
+              </a:uFill>
+              <a:latin typeface="Arial"/>
+              <a:ea typeface="Noto Sans CJK SC Regular"/>
+            </a:endParaRPr>
+          </a:p>
+          <a:p>
+            <a:pPr marL="432000" indent="-323640">
+              <a:lnSpc>
+                <a:spcPct val="100000"/>
+              </a:lnSpc>
               <a:buClr>
                 <a:srgbClr val="000000"/>
               </a:buClr>
@@ -2396,7 +4091,7 @@
               <a:buChar char=""/>
             </a:pPr>
             <a:r>
-              <a:rPr b="0" lang="en-US" sz="3200" spc="-1" strike="noStrike">
+              <a:rPr b="0" lang="en-US" sz="3200" spc="299" strike="noStrike">
                 <a:solidFill>
                   <a:srgbClr val="000000"/>
                 </a:solidFill>
@@ -2409,20 +4104,24 @@
               </a:rPr>
               <a:t>Pick up the poop</a:t>
             </a:r>
-            <a:endParaRPr b="0" lang="en-US" sz="3200" spc="-1" strike="noStrike">
-              <a:solidFill>
-                <a:srgbClr val="000000"/>
-              </a:solidFill>
-              <a:uFill>
-                <a:solidFill>
-                  <a:srgbClr val="ffffff"/>
-                </a:solidFill>
-              </a:uFill>
-              <a:latin typeface="Arial"/>
-            </a:endParaRPr>
-          </a:p>
-          <a:p>
-            <a:pPr marL="432000" indent="-324000">
+            <a:endParaRPr b="0" lang="en-US" sz="1800" spc="299" strike="noStrike">
+              <a:solidFill>
+                <a:srgbClr val="000000"/>
+              </a:solidFill>
+              <a:uFill>
+                <a:solidFill>
+                  <a:srgbClr val="ffffff"/>
+                </a:solidFill>
+              </a:uFill>
+              <a:latin typeface="Arial"/>
+              <a:ea typeface="Noto Sans CJK SC Regular"/>
+            </a:endParaRPr>
+          </a:p>
+          <a:p>
+            <a:pPr marL="432000" indent="-323640">
+              <a:lnSpc>
+                <a:spcPct val="100000"/>
+              </a:lnSpc>
               <a:buClr>
                 <a:srgbClr val="000000"/>
               </a:buClr>
@@ -2431,7 +4130,7 @@
               <a:buChar char=""/>
             </a:pPr>
             <a:r>
-              <a:rPr b="0" lang="en-US" sz="3200" spc="-1" strike="noStrike">
+              <a:rPr b="0" lang="en-US" sz="3200" spc="299" strike="noStrike">
                 <a:solidFill>
                   <a:srgbClr val="000000"/>
                 </a:solidFill>
@@ -2444,20 +4143,24 @@
               </a:rPr>
               <a:t>Don’t let your pet die</a:t>
             </a:r>
-            <a:endParaRPr b="0" lang="en-US" sz="3200" spc="-1" strike="noStrike">
-              <a:solidFill>
-                <a:srgbClr val="000000"/>
-              </a:solidFill>
-              <a:uFill>
-                <a:solidFill>
-                  <a:srgbClr val="ffffff"/>
-                </a:solidFill>
-              </a:uFill>
-              <a:latin typeface="Arial"/>
-            </a:endParaRPr>
-          </a:p>
-          <a:p>
-            <a:pPr marL="432000" indent="-324000">
+            <a:endParaRPr b="0" lang="en-US" sz="1800" spc="299" strike="noStrike">
+              <a:solidFill>
+                <a:srgbClr val="000000"/>
+              </a:solidFill>
+              <a:uFill>
+                <a:solidFill>
+                  <a:srgbClr val="ffffff"/>
+                </a:solidFill>
+              </a:uFill>
+              <a:latin typeface="Arial"/>
+              <a:ea typeface="Noto Sans CJK SC Regular"/>
+            </a:endParaRPr>
+          </a:p>
+          <a:p>
+            <a:pPr marL="432000" indent="-323640">
+              <a:lnSpc>
+                <a:spcPct val="100000"/>
+              </a:lnSpc>
               <a:buClr>
                 <a:srgbClr val="000000"/>
               </a:buClr>
@@ -2466,7 +4169,7 @@
               <a:buChar char=""/>
             </a:pPr>
             <a:r>
-              <a:rPr b="0" lang="en-US" sz="3200" spc="-1" strike="noStrike">
+              <a:rPr b="0" lang="en-US" sz="3200" spc="299" strike="noStrike">
                 <a:solidFill>
                   <a:srgbClr val="000000"/>
                 </a:solidFill>
@@ -2479,20 +4182,24 @@
               </a:rPr>
               <a:t>Have fun with your pet</a:t>
             </a:r>
-            <a:endParaRPr b="0" lang="en-US" sz="3200" spc="-1" strike="noStrike">
-              <a:solidFill>
-                <a:srgbClr val="000000"/>
-              </a:solidFill>
-              <a:uFill>
-                <a:solidFill>
-                  <a:srgbClr val="ffffff"/>
-                </a:solidFill>
-              </a:uFill>
-              <a:latin typeface="Arial"/>
-            </a:endParaRPr>
-          </a:p>
-          <a:p>
-            <a:pPr marL="432000" indent="-324000">
+            <a:endParaRPr b="0" lang="en-US" sz="1800" spc="299" strike="noStrike">
+              <a:solidFill>
+                <a:srgbClr val="000000"/>
+              </a:solidFill>
+              <a:uFill>
+                <a:solidFill>
+                  <a:srgbClr val="ffffff"/>
+                </a:solidFill>
+              </a:uFill>
+              <a:latin typeface="Arial"/>
+              <a:ea typeface="Noto Sans CJK SC Regular"/>
+            </a:endParaRPr>
+          </a:p>
+          <a:p>
+            <a:pPr marL="432000" indent="-323640">
+              <a:lnSpc>
+                <a:spcPct val="100000"/>
+              </a:lnSpc>
               <a:buClr>
                 <a:srgbClr val="000000"/>
               </a:buClr>
@@ -2501,7 +4208,7 @@
               <a:buChar char=""/>
             </a:pPr>
             <a:r>
-              <a:rPr b="0" lang="en-US" sz="3200" spc="-1" strike="noStrike">
+              <a:rPr b="0" lang="en-US" sz="3200" spc="299" strike="noStrike">
                 <a:solidFill>
                   <a:srgbClr val="000000"/>
                 </a:solidFill>
@@ -2514,16 +4221,17 @@
               </a:rPr>
               <a:t>Don’t let your pet die</a:t>
             </a:r>
-            <a:endParaRPr b="0" lang="en-US" sz="3200" spc="-1" strike="noStrike">
-              <a:solidFill>
-                <a:srgbClr val="000000"/>
-              </a:solidFill>
-              <a:uFill>
-                <a:solidFill>
-                  <a:srgbClr val="ffffff"/>
-                </a:solidFill>
-              </a:uFill>
-              <a:latin typeface="Arial"/>
+            <a:endParaRPr b="0" lang="en-US" sz="1800" spc="299" strike="noStrike">
+              <a:solidFill>
+                <a:srgbClr val="000000"/>
+              </a:solidFill>
+              <a:uFill>
+                <a:solidFill>
+                  <a:srgbClr val="ffffff"/>
+                </a:solidFill>
+              </a:uFill>
+              <a:latin typeface="Arial"/>
+              <a:ea typeface="Noto Sans CJK SC Regular"/>
             </a:endParaRPr>
           </a:p>
         </p:txBody>
@@ -2579,14 +4287,14 @@
       </p:grpSpPr>
       <p:sp>
         <p:nvSpPr>
-          <p:cNvPr id="46" name="TextShape 1"/>
-          <p:cNvSpPr txBox="1"/>
+          <p:cNvPr id="79" name="CustomShape 1"/>
+          <p:cNvSpPr/>
           <p:nvPr/>
         </p:nvSpPr>
         <p:spPr>
           <a:xfrm>
             <a:off x="504000" y="301320"/>
-            <a:ext cx="9071640" cy="1262160"/>
+            <a:ext cx="9071280" cy="1261800"/>
           </a:xfrm>
           <a:prstGeom prst="rect">
             <a:avLst/>
@@ -2596,10 +4304,20 @@
             <a:noFill/>
           </a:ln>
         </p:spPr>
+        <p:style>
+          <a:lnRef idx="0"/>
+          <a:fillRef idx="0"/>
+          <a:effectRef idx="0"/>
+          <a:fontRef idx="minor"/>
+        </p:style>
         <p:txBody>
           <a:bodyPr lIns="0" rIns="0" tIns="0" bIns="0" anchor="ctr"/>
           <a:p>
-            <a:pPr algn="ctr"/>
+            <a:pPr algn="ctr">
+              <a:lnSpc>
+                <a:spcPct val="100000"/>
+              </a:lnSpc>
+            </a:pPr>
             <a:r>
               <a:rPr b="0" lang="en-US" sz="4400" spc="-1" strike="noStrike">
                 <a:solidFill>
@@ -2614,30 +4332,30 @@
               </a:rPr>
               <a:t>Process</a:t>
             </a:r>
-            <a:endParaRPr b="0" lang="en-US" sz="4400" spc="-1" strike="noStrike">
-              <a:solidFill>
-                <a:srgbClr val="000000"/>
-              </a:solidFill>
-              <a:uFill>
-                <a:solidFill>
-                  <a:srgbClr val="ffffff"/>
-                </a:solidFill>
-              </a:uFill>
-              <a:latin typeface="Arial"/>
-            </a:endParaRPr>
-          </a:p>
-        </p:txBody>
-      </p:sp>
-      <p:sp>
-        <p:nvSpPr>
-          <p:cNvPr id="47" name="TextShape 2"/>
-          <p:cNvSpPr txBox="1"/>
+            <a:endParaRPr b="0" lang="en-US" sz="1800" spc="-1" strike="noStrike">
+              <a:solidFill>
+                <a:srgbClr val="000000"/>
+              </a:solidFill>
+              <a:uFill>
+                <a:solidFill>
+                  <a:srgbClr val="ffffff"/>
+                </a:solidFill>
+              </a:uFill>
+              <a:latin typeface="Arial"/>
+            </a:endParaRPr>
+          </a:p>
+        </p:txBody>
+      </p:sp>
+      <p:sp>
+        <p:nvSpPr>
+          <p:cNvPr id="80" name="CustomShape 2"/>
+          <p:cNvSpPr/>
           <p:nvPr/>
         </p:nvSpPr>
         <p:spPr>
           <a:xfrm>
             <a:off x="504000" y="1769040"/>
-            <a:ext cx="9071640" cy="4384440"/>
+            <a:ext cx="9071280" cy="4384080"/>
           </a:xfrm>
           <a:prstGeom prst="rect">
             <a:avLst/>
@@ -2647,10 +4365,19 @@
             <a:noFill/>
           </a:ln>
         </p:spPr>
+        <p:style>
+          <a:lnRef idx="0"/>
+          <a:fillRef idx="0"/>
+          <a:effectRef idx="0"/>
+          <a:fontRef idx="minor"/>
+        </p:style>
         <p:txBody>
           <a:bodyPr lIns="0" rIns="0" tIns="0" bIns="0"/>
           <a:p>
-            <a:pPr marL="432000" indent="-324000">
+            <a:pPr marL="432000" indent="-323640">
+              <a:lnSpc>
+                <a:spcPct val="100000"/>
+              </a:lnSpc>
               <a:buClr>
                 <a:srgbClr val="000000"/>
               </a:buClr>
@@ -2672,25 +4399,28 @@
               </a:rPr>
               <a:t>1) jot initial ideas down on paper.</a:t>
             </a:r>
-            <a:endParaRPr b="0" lang="en-US" sz="3200" spc="-1" strike="noStrike">
-              <a:solidFill>
-                <a:srgbClr val="000000"/>
-              </a:solidFill>
-              <a:uFill>
-                <a:solidFill>
-                  <a:srgbClr val="ffffff"/>
-                </a:solidFill>
-              </a:uFill>
-              <a:latin typeface="Arial"/>
-            </a:endParaRPr>
-          </a:p>
-          <a:p>
-            <a:pPr lvl="1" marL="864000" indent="-324000">
+            <a:endParaRPr b="0" lang="en-US" sz="1800" spc="-1" strike="noStrike">
+              <a:solidFill>
+                <a:srgbClr val="000000"/>
+              </a:solidFill>
+              <a:uFill>
+                <a:solidFill>
+                  <a:srgbClr val="ffffff"/>
+                </a:solidFill>
+              </a:uFill>
+              <a:latin typeface="Arial"/>
+            </a:endParaRPr>
+          </a:p>
+          <a:p>
+            <a:pPr lvl="1" marL="864000" indent="-323640">
+              <a:lnSpc>
+                <a:spcPct val="100000"/>
+              </a:lnSpc>
               <a:buClr>
                 <a:srgbClr val="000000"/>
               </a:buClr>
               <a:buSzPct val="75000"/>
-              <a:buFont typeface="Symbol" charset="2"/>
+              <a:buFont typeface="Symbol"/>
               <a:buChar char=""/>
             </a:pPr>
             <a:r>
@@ -2707,20 +4437,23 @@
               </a:rPr>
               <a:t>ex wireframe/pseudocode</a:t>
             </a:r>
-            <a:endParaRPr b="0" lang="en-US" sz="2800" spc="-1" strike="noStrike">
-              <a:solidFill>
-                <a:srgbClr val="000000"/>
-              </a:solidFill>
-              <a:uFill>
-                <a:solidFill>
-                  <a:srgbClr val="ffffff"/>
-                </a:solidFill>
-              </a:uFill>
-              <a:latin typeface="Arial"/>
-            </a:endParaRPr>
-          </a:p>
-          <a:p>
-            <a:pPr marL="432000" indent="-324000">
+            <a:endParaRPr b="0" lang="en-US" sz="1800" spc="-1" strike="noStrike">
+              <a:solidFill>
+                <a:srgbClr val="000000"/>
+              </a:solidFill>
+              <a:uFill>
+                <a:solidFill>
+                  <a:srgbClr val="ffffff"/>
+                </a:solidFill>
+              </a:uFill>
+              <a:latin typeface="Arial"/>
+            </a:endParaRPr>
+          </a:p>
+          <a:p>
+            <a:pPr marL="432000" indent="-323640">
+              <a:lnSpc>
+                <a:spcPct val="100000"/>
+              </a:lnSpc>
               <a:buClr>
                 <a:srgbClr val="000000"/>
               </a:buClr>
@@ -2742,25 +4475,28 @@
               </a:rPr>
               <a:t>2) start with one game element at a time</a:t>
             </a:r>
-            <a:endParaRPr b="0" lang="en-US" sz="3200" spc="-1" strike="noStrike">
-              <a:solidFill>
-                <a:srgbClr val="000000"/>
-              </a:solidFill>
-              <a:uFill>
-                <a:solidFill>
-                  <a:srgbClr val="ffffff"/>
-                </a:solidFill>
-              </a:uFill>
-              <a:latin typeface="Arial"/>
-            </a:endParaRPr>
-          </a:p>
-          <a:p>
-            <a:pPr lvl="1" marL="864000" indent="-324000">
+            <a:endParaRPr b="0" lang="en-US" sz="1800" spc="-1" strike="noStrike">
+              <a:solidFill>
+                <a:srgbClr val="000000"/>
+              </a:solidFill>
+              <a:uFill>
+                <a:solidFill>
+                  <a:srgbClr val="ffffff"/>
+                </a:solidFill>
+              </a:uFill>
+              <a:latin typeface="Arial"/>
+            </a:endParaRPr>
+          </a:p>
+          <a:p>
+            <a:pPr lvl="1" marL="864000" indent="-323640">
+              <a:lnSpc>
+                <a:spcPct val="100000"/>
+              </a:lnSpc>
               <a:buClr>
                 <a:srgbClr val="000000"/>
               </a:buClr>
               <a:buSzPct val="75000"/>
-              <a:buFont typeface="Symbol" charset="2"/>
+              <a:buFont typeface="Symbol"/>
               <a:buChar char=""/>
             </a:pPr>
             <a:r>
@@ -2777,20 +4513,23 @@
               </a:rPr>
               <a:t>ex) get feeding working 100% before introducing variety of foods</a:t>
             </a:r>
-            <a:endParaRPr b="0" lang="en-US" sz="2800" spc="-1" strike="noStrike">
-              <a:solidFill>
-                <a:srgbClr val="000000"/>
-              </a:solidFill>
-              <a:uFill>
-                <a:solidFill>
-                  <a:srgbClr val="ffffff"/>
-                </a:solidFill>
-              </a:uFill>
-              <a:latin typeface="Arial"/>
-            </a:endParaRPr>
-          </a:p>
-          <a:p>
-            <a:pPr marL="432000" indent="-324000">
+            <a:endParaRPr b="0" lang="en-US" sz="1800" spc="-1" strike="noStrike">
+              <a:solidFill>
+                <a:srgbClr val="000000"/>
+              </a:solidFill>
+              <a:uFill>
+                <a:solidFill>
+                  <a:srgbClr val="ffffff"/>
+                </a:solidFill>
+              </a:uFill>
+              <a:latin typeface="Arial"/>
+            </a:endParaRPr>
+          </a:p>
+          <a:p>
+            <a:pPr marL="432000" indent="-323640">
+              <a:lnSpc>
+                <a:spcPct val="100000"/>
+              </a:lnSpc>
               <a:buClr>
                 <a:srgbClr val="000000"/>
               </a:buClr>
@@ -2812,25 +4551,28 @@
               </a:rPr>
               <a:t>3) break up the data from the display</a:t>
             </a:r>
-            <a:endParaRPr b="0" lang="en-US" sz="3200" spc="-1" strike="noStrike">
-              <a:solidFill>
-                <a:srgbClr val="000000"/>
-              </a:solidFill>
-              <a:uFill>
-                <a:solidFill>
-                  <a:srgbClr val="ffffff"/>
-                </a:solidFill>
-              </a:uFill>
-              <a:latin typeface="Arial"/>
-            </a:endParaRPr>
-          </a:p>
-          <a:p>
-            <a:pPr lvl="1" marL="864000" indent="-324000">
+            <a:endParaRPr b="0" lang="en-US" sz="1800" spc="-1" strike="noStrike">
+              <a:solidFill>
+                <a:srgbClr val="000000"/>
+              </a:solidFill>
+              <a:uFill>
+                <a:solidFill>
+                  <a:srgbClr val="ffffff"/>
+                </a:solidFill>
+              </a:uFill>
+              <a:latin typeface="Arial"/>
+            </a:endParaRPr>
+          </a:p>
+          <a:p>
+            <a:pPr lvl="1" marL="864000" indent="-323640">
+              <a:lnSpc>
+                <a:spcPct val="100000"/>
+              </a:lnSpc>
               <a:buClr>
                 <a:srgbClr val="000000"/>
               </a:buClr>
               <a:buSzPct val="75000"/>
-              <a:buFont typeface="Symbol" charset="2"/>
+              <a:buFont typeface="Symbol"/>
               <a:buChar char=""/>
             </a:pPr>
             <a:r>
@@ -2847,20 +4589,23 @@
               </a:rPr>
               <a:t>Makes it easier to debug when the two are separated </a:t>
             </a:r>
-            <a:endParaRPr b="0" lang="en-US" sz="2800" spc="-1" strike="noStrike">
-              <a:solidFill>
-                <a:srgbClr val="000000"/>
-              </a:solidFill>
-              <a:uFill>
-                <a:solidFill>
-                  <a:srgbClr val="ffffff"/>
-                </a:solidFill>
-              </a:uFill>
-              <a:latin typeface="Arial"/>
-            </a:endParaRPr>
-          </a:p>
-          <a:p>
-            <a:pPr marL="432000" indent="-324000">
+            <a:endParaRPr b="0" lang="en-US" sz="1800" spc="-1" strike="noStrike">
+              <a:solidFill>
+                <a:srgbClr val="000000"/>
+              </a:solidFill>
+              <a:uFill>
+                <a:solidFill>
+                  <a:srgbClr val="ffffff"/>
+                </a:solidFill>
+              </a:uFill>
+              <a:latin typeface="Arial"/>
+            </a:endParaRPr>
+          </a:p>
+          <a:p>
+            <a:pPr marL="432000" indent="-323640">
+              <a:lnSpc>
+                <a:spcPct val="100000"/>
+              </a:lnSpc>
               <a:buClr>
                 <a:srgbClr val="000000"/>
               </a:buClr>
@@ -2882,25 +4627,28 @@
               </a:rPr>
               <a:t>4) review previous code, try to find patterns, and simplify</a:t>
             </a:r>
-            <a:endParaRPr b="0" lang="en-US" sz="3200" spc="-1" strike="noStrike">
-              <a:solidFill>
-                <a:srgbClr val="000000"/>
-              </a:solidFill>
-              <a:uFill>
-                <a:solidFill>
-                  <a:srgbClr val="ffffff"/>
-                </a:solidFill>
-              </a:uFill>
-              <a:latin typeface="Arial"/>
-            </a:endParaRPr>
-          </a:p>
-          <a:p>
-            <a:pPr lvl="1" marL="864000" indent="-324000">
+            <a:endParaRPr b="0" lang="en-US" sz="1800" spc="-1" strike="noStrike">
+              <a:solidFill>
+                <a:srgbClr val="000000"/>
+              </a:solidFill>
+              <a:uFill>
+                <a:solidFill>
+                  <a:srgbClr val="ffffff"/>
+                </a:solidFill>
+              </a:uFill>
+              <a:latin typeface="Arial"/>
+            </a:endParaRPr>
+          </a:p>
+          <a:p>
+            <a:pPr lvl="1" marL="864000" indent="-323640">
+              <a:lnSpc>
+                <a:spcPct val="100000"/>
+              </a:lnSpc>
               <a:buClr>
                 <a:srgbClr val="000000"/>
               </a:buClr>
               <a:buSzPct val="75000"/>
-              <a:buFont typeface="Symbol" charset="2"/>
+              <a:buFont typeface="Symbol"/>
               <a:buChar char=""/>
             </a:pPr>
             <a:r>
@@ -2917,7 +4665,7 @@
               </a:rPr>
               <a:t> </a:t>
             </a:r>
-            <a:endParaRPr b="0" lang="en-US" sz="2800" spc="-1" strike="noStrike">
+            <a:endParaRPr b="0" lang="en-US" sz="1800" spc="-1" strike="noStrike">
               <a:solidFill>
                 <a:srgbClr val="000000"/>
               </a:solidFill>
@@ -2982,7 +4730,7 @@
       </p:grpSpPr>
       <p:pic>
         <p:nvPicPr>
-          <p:cNvPr id="48" name="" descr=""/>
+          <p:cNvPr id="81" name="" descr=""/>
           <p:cNvPicPr/>
           <p:nvPr/>
         </p:nvPicPr>
@@ -2992,8 +4740,8 @@
         </p:blipFill>
         <p:spPr>
           <a:xfrm>
-            <a:off x="1463040" y="91440"/>
-            <a:ext cx="7067160" cy="7381440"/>
+            <a:off x="2041560" y="148680"/>
+            <a:ext cx="6076440" cy="7305480"/>
           </a:xfrm>
           <a:prstGeom prst="rect">
             <a:avLst/>
@@ -3003,6 +4751,27 @@
           </a:ln>
         </p:spPr>
       </p:pic>
+      <p:cxnSp>
+        <p:nvCxnSpPr>
+          <p:cNvPr id="82" name="Line 1"/>
+          <p:cNvCxnSpPr/>
+          <p:nvPr/>
+        </p:nvCxnSpPr>
+        <p:spPr>
+          <a:xfrm>
+            <a:off x="0" y="0"/>
+            <a:ext cx="360" cy="360"/>
+          </a:xfrm>
+          <a:prstGeom prst="line">
+            <a:avLst/>
+          </a:prstGeom>
+          <a:ln>
+            <a:solidFill>
+              <a:srgbClr val="3465a4"/>
+            </a:solidFill>
+          </a:ln>
+        </p:spPr>
+      </p:cxnSp>
     </p:spTree>
   </p:cSld>
   <p:timing>
@@ -3052,60 +4821,9 @@
           <a:chExt cx="0" cy="0"/>
         </a:xfrm>
       </p:grpSpPr>
-      <p:sp>
-        <p:nvSpPr>
-          <p:cNvPr id="49" name="TextShape 1"/>
-          <p:cNvSpPr txBox="1"/>
-          <p:nvPr/>
-        </p:nvSpPr>
-        <p:spPr>
-          <a:xfrm>
-            <a:off x="504000" y="301320"/>
-            <a:ext cx="9071640" cy="1262160"/>
-          </a:xfrm>
-          <a:prstGeom prst="rect">
-            <a:avLst/>
-          </a:prstGeom>
-          <a:noFill/>
-          <a:ln>
-            <a:noFill/>
-          </a:ln>
-        </p:spPr>
-        <p:txBody>
-          <a:bodyPr lIns="0" rIns="0" tIns="0" bIns="0" anchor="ctr"/>
-          <a:p>
-            <a:pPr algn="ctr"/>
-            <a:r>
-              <a:rPr b="0" lang="en-US" sz="4400" spc="-1" strike="noStrike">
-                <a:solidFill>
-                  <a:srgbClr val="000000"/>
-                </a:solidFill>
-                <a:uFill>
-                  <a:solidFill>
-                    <a:srgbClr val="ffffff"/>
-                  </a:solidFill>
-                </a:uFill>
-                <a:latin typeface="Arial"/>
-              </a:rPr>
-              <a:t>Code Examples</a:t>
-            </a:r>
-            <a:endParaRPr b="0" lang="en-US" sz="4400" spc="-1" strike="noStrike">
-              <a:solidFill>
-                <a:srgbClr val="000000"/>
-              </a:solidFill>
-              <a:uFill>
-                <a:solidFill>
-                  <a:srgbClr val="ffffff"/>
-                </a:solidFill>
-              </a:uFill>
-              <a:latin typeface="Arial"/>
-            </a:endParaRPr>
-          </a:p>
-        </p:txBody>
-      </p:sp>
       <p:pic>
         <p:nvPicPr>
-          <p:cNvPr id="50" name="" descr=""/>
+          <p:cNvPr id="83" name="" descr=""/>
           <p:cNvPicPr/>
           <p:nvPr/>
         </p:nvPicPr>
@@ -3115,8 +4833,8 @@
         </p:blipFill>
         <p:spPr>
           <a:xfrm>
-            <a:off x="274320" y="1463040"/>
-            <a:ext cx="7295760" cy="3647880"/>
+            <a:off x="2194560" y="397080"/>
+            <a:ext cx="5817600" cy="7092720"/>
           </a:xfrm>
           <a:prstGeom prst="rect">
             <a:avLst/>
@@ -3175,60 +4893,9 @@
           <a:chExt cx="0" cy="0"/>
         </a:xfrm>
       </p:grpSpPr>
-      <p:sp>
-        <p:nvSpPr>
-          <p:cNvPr id="51" name="TextShape 1"/>
-          <p:cNvSpPr txBox="1"/>
-          <p:nvPr/>
-        </p:nvSpPr>
-        <p:spPr>
-          <a:xfrm>
-            <a:off x="504000" y="301320"/>
-            <a:ext cx="9071640" cy="1262160"/>
-          </a:xfrm>
-          <a:prstGeom prst="rect">
-            <a:avLst/>
-          </a:prstGeom>
-          <a:noFill/>
-          <a:ln>
-            <a:noFill/>
-          </a:ln>
-        </p:spPr>
-        <p:txBody>
-          <a:bodyPr lIns="0" rIns="0" tIns="0" bIns="0" anchor="ctr"/>
-          <a:p>
-            <a:pPr algn="ctr"/>
-            <a:r>
-              <a:rPr b="0" lang="en-US" sz="4400" spc="-1" strike="noStrike">
-                <a:solidFill>
-                  <a:srgbClr val="000000"/>
-                </a:solidFill>
-                <a:uFill>
-                  <a:solidFill>
-                    <a:srgbClr val="ffffff"/>
-                  </a:solidFill>
-                </a:uFill>
-                <a:latin typeface="Arial"/>
-              </a:rPr>
-              <a:t>Screen shots</a:t>
-            </a:r>
-            <a:endParaRPr b="0" lang="en-US" sz="4400" spc="-1" strike="noStrike">
-              <a:solidFill>
-                <a:srgbClr val="000000"/>
-              </a:solidFill>
-              <a:uFill>
-                <a:solidFill>
-                  <a:srgbClr val="ffffff"/>
-                </a:solidFill>
-              </a:uFill>
-              <a:latin typeface="Arial"/>
-            </a:endParaRPr>
-          </a:p>
-        </p:txBody>
-      </p:sp>
       <p:pic>
         <p:nvPicPr>
-          <p:cNvPr id="52" name="" descr=""/>
+          <p:cNvPr id="84" name="" descr=""/>
           <p:cNvPicPr/>
           <p:nvPr/>
         </p:nvPicPr>
@@ -3238,8 +4905,8 @@
         </p:blipFill>
         <p:spPr>
           <a:xfrm>
-            <a:off x="39960" y="439200"/>
-            <a:ext cx="10079640" cy="6724800"/>
+            <a:off x="1463040" y="91440"/>
+            <a:ext cx="7066800" cy="7381080"/>
           </a:xfrm>
           <a:prstGeom prst="rect">
             <a:avLst/>
@@ -3258,6 +4925,665 @@
           <p:childTnLst>
             <p:seq>
               <p:cTn id="12" nodeType="mainSeq"/>
+              <p:prevCondLst>
+                <p:cond delay="0" evt="onPrev">
+                  <p:tgtEl>
+                    <p:sldTgt/>
+                  </p:tgtEl>
+                </p:cond>
+              </p:prevCondLst>
+              <p:nextCondLst>
+                <p:cond delay="0" evt="onNext">
+                  <p:tgtEl>
+                    <p:sldTgt/>
+                  </p:tgtEl>
+                </p:cond>
+              </p:nextCondLst>
+            </p:seq>
+          </p:childTnLst>
+        </p:cTn>
+      </p:par>
+    </p:tnLst>
+  </p:timing>
+</p:sld>
+</file>
+
+<file path=ppt/slides/slide7.xml><?xml version="1.0" encoding="utf-8"?>
+<p:sld xmlns:a="http://schemas.openxmlformats.org/drawingml/2006/main" xmlns:p="http://schemas.openxmlformats.org/presentationml/2006/main" xmlns:r="http://schemas.openxmlformats.org/officeDocument/2006/relationships" xmlns:p14="http://schemas.microsoft.com/office/powerpoint/2010/main" xmlns:p15="http://schemas.microsoft.com/office/powerpoint/2012/main" xmlns:mc="http://schemas.openxmlformats.org/markup-compatibility/2006">
+  <p:cSld>
+    <p:spTree>
+      <p:nvGrpSpPr>
+        <p:cNvPr id="1" name=""/>
+        <p:cNvGrpSpPr/>
+        <p:nvPr/>
+      </p:nvGrpSpPr>
+      <p:grpSpPr>
+        <a:xfrm>
+          <a:off x="0" y="0"/>
+          <a:ext cx="0" cy="0"/>
+          <a:chOff x="0" y="0"/>
+          <a:chExt cx="0" cy="0"/>
+        </a:xfrm>
+      </p:grpSpPr>
+      <p:sp>
+        <p:nvSpPr>
+          <p:cNvPr id="85" name="CustomShape 1"/>
+          <p:cNvSpPr/>
+          <p:nvPr/>
+        </p:nvSpPr>
+        <p:spPr>
+          <a:xfrm>
+            <a:off x="504000" y="301320"/>
+            <a:ext cx="9071280" cy="1261800"/>
+          </a:xfrm>
+          <a:prstGeom prst="rect">
+            <a:avLst/>
+          </a:prstGeom>
+          <a:noFill/>
+          <a:ln>
+            <a:noFill/>
+          </a:ln>
+        </p:spPr>
+        <p:style>
+          <a:lnRef idx="0"/>
+          <a:fillRef idx="0"/>
+          <a:effectRef idx="0"/>
+          <a:fontRef idx="minor"/>
+        </p:style>
+        <p:txBody>
+          <a:bodyPr lIns="0" rIns="0" tIns="0" bIns="0" anchor="ctr"/>
+          <a:p>
+            <a:pPr algn="ctr">
+              <a:lnSpc>
+                <a:spcPct val="100000"/>
+              </a:lnSpc>
+            </a:pPr>
+            <a:r>
+              <a:rPr b="0" lang="en-US" sz="4400" spc="-1" strike="noStrike">
+                <a:solidFill>
+                  <a:srgbClr val="000000"/>
+                </a:solidFill>
+                <a:uFill>
+                  <a:solidFill>
+                    <a:srgbClr val="ffffff"/>
+                  </a:solidFill>
+                </a:uFill>
+                <a:latin typeface="Arial"/>
+              </a:rPr>
+              <a:t>Biggest win – adding experience and unlocking items</a:t>
+            </a:r>
+            <a:endParaRPr b="0" lang="en-US" sz="1800" spc="-1" strike="noStrike">
+              <a:solidFill>
+                <a:srgbClr val="000000"/>
+              </a:solidFill>
+              <a:uFill>
+                <a:solidFill>
+                  <a:srgbClr val="ffffff"/>
+                </a:solidFill>
+              </a:uFill>
+              <a:latin typeface="Arial"/>
+            </a:endParaRPr>
+          </a:p>
+        </p:txBody>
+      </p:sp>
+      <p:pic>
+        <p:nvPicPr>
+          <p:cNvPr id="86" name="" descr=""/>
+          <p:cNvPicPr/>
+          <p:nvPr/>
+        </p:nvPicPr>
+        <p:blipFill>
+          <a:blip r:embed="rId1"/>
+          <a:stretch/>
+        </p:blipFill>
+        <p:spPr>
+          <a:xfrm>
+            <a:off x="1482840" y="2103120"/>
+            <a:ext cx="7295400" cy="3647520"/>
+          </a:xfrm>
+          <a:prstGeom prst="rect">
+            <a:avLst/>
+          </a:prstGeom>
+          <a:ln>
+            <a:noFill/>
+          </a:ln>
+        </p:spPr>
+      </p:pic>
+    </p:spTree>
+  </p:cSld>
+  <p:timing>
+    <p:tnLst>
+      <p:par>
+        <p:cTn id="13" dur="indefinite" restart="never" nodeType="tmRoot">
+          <p:childTnLst>
+            <p:seq>
+              <p:cTn id="14" nodeType="mainSeq"/>
+              <p:prevCondLst>
+                <p:cond delay="0" evt="onPrev">
+                  <p:tgtEl>
+                    <p:sldTgt/>
+                  </p:tgtEl>
+                </p:cond>
+              </p:prevCondLst>
+              <p:nextCondLst>
+                <p:cond delay="0" evt="onNext">
+                  <p:tgtEl>
+                    <p:sldTgt/>
+                  </p:tgtEl>
+                </p:cond>
+              </p:nextCondLst>
+            </p:seq>
+          </p:childTnLst>
+        </p:cTn>
+      </p:par>
+    </p:tnLst>
+  </p:timing>
+</p:sld>
+</file>
+
+<file path=ppt/slides/slide8.xml><?xml version="1.0" encoding="utf-8"?>
+<p:sld xmlns:a="http://schemas.openxmlformats.org/drawingml/2006/main" xmlns:p="http://schemas.openxmlformats.org/presentationml/2006/main" xmlns:r="http://schemas.openxmlformats.org/officeDocument/2006/relationships" xmlns:p14="http://schemas.microsoft.com/office/powerpoint/2010/main" xmlns:p15="http://schemas.microsoft.com/office/powerpoint/2012/main" xmlns:mc="http://schemas.openxmlformats.org/markup-compatibility/2006">
+  <p:cSld>
+    <p:spTree>
+      <p:nvGrpSpPr>
+        <p:cNvPr id="1" name=""/>
+        <p:cNvGrpSpPr/>
+        <p:nvPr/>
+      </p:nvGrpSpPr>
+      <p:grpSpPr>
+        <a:xfrm>
+          <a:off x="0" y="0"/>
+          <a:ext cx="0" cy="0"/>
+          <a:chOff x="0" y="0"/>
+          <a:chExt cx="0" cy="0"/>
+        </a:xfrm>
+      </p:grpSpPr>
+      <p:sp>
+        <p:nvSpPr>
+          <p:cNvPr id="87" name="CustomShape 1"/>
+          <p:cNvSpPr/>
+          <p:nvPr/>
+        </p:nvSpPr>
+        <p:spPr>
+          <a:xfrm>
+            <a:off x="504000" y="201240"/>
+            <a:ext cx="9071280" cy="1261800"/>
+          </a:xfrm>
+          <a:prstGeom prst="rect">
+            <a:avLst/>
+          </a:prstGeom>
+          <a:noFill/>
+          <a:ln>
+            <a:noFill/>
+          </a:ln>
+        </p:spPr>
+        <p:style>
+          <a:lnRef idx="0"/>
+          <a:fillRef idx="0"/>
+          <a:effectRef idx="0"/>
+          <a:fontRef idx="minor"/>
+        </p:style>
+        <p:txBody>
+          <a:bodyPr lIns="0" rIns="0" tIns="0" bIns="0" anchor="ctr"/>
+          <a:p>
+            <a:pPr algn="ctr">
+              <a:lnSpc>
+                <a:spcPct val="100000"/>
+              </a:lnSpc>
+            </a:pPr>
+            <a:r>
+              <a:rPr b="0" lang="en-US" sz="3600" spc="-1" strike="noStrike">
+                <a:solidFill>
+                  <a:srgbClr val="000000"/>
+                </a:solidFill>
+                <a:uFill>
+                  <a:solidFill>
+                    <a:srgbClr val="ffffff"/>
+                  </a:solidFill>
+                </a:uFill>
+                <a:latin typeface="Arial"/>
+              </a:rPr>
+              <a:t>Challenge – lining up the accessories on different screen sizes</a:t>
+            </a:r>
+            <a:endParaRPr b="0" lang="en-US" sz="3600" spc="-1" strike="noStrike">
+              <a:solidFill>
+                <a:srgbClr val="000000"/>
+              </a:solidFill>
+              <a:uFill>
+                <a:solidFill>
+                  <a:srgbClr val="ffffff"/>
+                </a:solidFill>
+              </a:uFill>
+              <a:latin typeface="Arial"/>
+            </a:endParaRPr>
+          </a:p>
+        </p:txBody>
+      </p:sp>
+      <p:pic>
+        <p:nvPicPr>
+          <p:cNvPr id="88" name="" descr=""/>
+          <p:cNvPicPr/>
+          <p:nvPr/>
+        </p:nvPicPr>
+        <p:blipFill>
+          <a:blip r:embed="rId1"/>
+          <a:stretch/>
+        </p:blipFill>
+        <p:spPr>
+          <a:xfrm>
+            <a:off x="588600" y="1371600"/>
+            <a:ext cx="9286920" cy="6195960"/>
+          </a:xfrm>
+          <a:prstGeom prst="rect">
+            <a:avLst/>
+          </a:prstGeom>
+          <a:ln>
+            <a:noFill/>
+          </a:ln>
+        </p:spPr>
+      </p:pic>
+    </p:spTree>
+  </p:cSld>
+  <p:timing>
+    <p:tnLst>
+      <p:par>
+        <p:cTn id="15" dur="indefinite" restart="never" nodeType="tmRoot">
+          <p:childTnLst>
+            <p:seq>
+              <p:cTn id="16" nodeType="mainSeq"/>
+              <p:prevCondLst>
+                <p:cond delay="0" evt="onPrev">
+                  <p:tgtEl>
+                    <p:sldTgt/>
+                  </p:tgtEl>
+                </p:cond>
+              </p:prevCondLst>
+              <p:nextCondLst>
+                <p:cond delay="0" evt="onNext">
+                  <p:tgtEl>
+                    <p:sldTgt/>
+                  </p:tgtEl>
+                </p:cond>
+              </p:nextCondLst>
+            </p:seq>
+          </p:childTnLst>
+        </p:cTn>
+      </p:par>
+    </p:tnLst>
+  </p:timing>
+</p:sld>
+</file>
+
+<file path=ppt/slides/slide9.xml><?xml version="1.0" encoding="utf-8"?>
+<p:sld xmlns:a="http://schemas.openxmlformats.org/drawingml/2006/main" xmlns:p="http://schemas.openxmlformats.org/presentationml/2006/main" xmlns:r="http://schemas.openxmlformats.org/officeDocument/2006/relationships" xmlns:p14="http://schemas.microsoft.com/office/powerpoint/2010/main" xmlns:p15="http://schemas.microsoft.com/office/powerpoint/2012/main" xmlns:mc="http://schemas.openxmlformats.org/markup-compatibility/2006">
+  <p:cSld>
+    <p:spTree>
+      <p:nvGrpSpPr>
+        <p:cNvPr id="1" name=""/>
+        <p:cNvGrpSpPr/>
+        <p:nvPr/>
+      </p:nvGrpSpPr>
+      <p:grpSpPr>
+        <a:xfrm>
+          <a:off x="0" y="0"/>
+          <a:ext cx="0" cy="0"/>
+          <a:chOff x="0" y="0"/>
+          <a:chExt cx="0" cy="0"/>
+        </a:xfrm>
+      </p:grpSpPr>
+      <p:sp>
+        <p:nvSpPr>
+          <p:cNvPr id="89" name="TextShape 1"/>
+          <p:cNvSpPr txBox="1"/>
+          <p:nvPr/>
+        </p:nvSpPr>
+        <p:spPr>
+          <a:xfrm>
+            <a:off x="1463040" y="825120"/>
+            <a:ext cx="7680960" cy="6215760"/>
+          </a:xfrm>
+          <a:prstGeom prst="rect">
+            <a:avLst/>
+          </a:prstGeom>
+          <a:noFill/>
+          <a:ln>
+            <a:noFill/>
+          </a:ln>
+        </p:spPr>
+        <p:txBody>
+          <a:bodyPr lIns="90000" rIns="90000" tIns="45000" bIns="45000"/>
+          <a:p>
+            <a:pPr>
+              <a:lnSpc>
+                <a:spcPct val="100000"/>
+              </a:lnSpc>
+            </a:pPr>
+            <a:r>
+              <a:rPr b="0" lang="en-US" sz="2400" spc="-1" strike="noStrike">
+                <a:solidFill>
+                  <a:srgbClr val="000000"/>
+                </a:solidFill>
+                <a:uFill>
+                  <a:solidFill>
+                    <a:srgbClr val="ffffff"/>
+                  </a:solidFill>
+                </a:uFill>
+                <a:latin typeface="Arial"/>
+              </a:rPr>
+              <a:t>If I had one more week:</a:t>
+            </a:r>
+            <a:endParaRPr b="0" lang="en-US" sz="1800" spc="-1" strike="noStrike">
+              <a:solidFill>
+                <a:srgbClr val="000000"/>
+              </a:solidFill>
+              <a:uFill>
+                <a:solidFill>
+                  <a:srgbClr val="ffffff"/>
+                </a:solidFill>
+              </a:uFill>
+              <a:latin typeface="Arial"/>
+              <a:ea typeface="Noto Sans CJK SC Regular"/>
+            </a:endParaRPr>
+          </a:p>
+          <a:p>
+            <a:pPr>
+              <a:lnSpc>
+                <a:spcPct val="100000"/>
+              </a:lnSpc>
+            </a:pPr>
+            <a:endParaRPr b="0" lang="en-US" sz="1800" spc="-1" strike="noStrike">
+              <a:solidFill>
+                <a:srgbClr val="000000"/>
+              </a:solidFill>
+              <a:uFill>
+                <a:solidFill>
+                  <a:srgbClr val="ffffff"/>
+                </a:solidFill>
+              </a:uFill>
+              <a:latin typeface="Arial"/>
+              <a:ea typeface="Noto Sans CJK SC Regular"/>
+            </a:endParaRPr>
+          </a:p>
+          <a:p>
+            <a:pPr>
+              <a:lnSpc>
+                <a:spcPct val="100000"/>
+              </a:lnSpc>
+            </a:pPr>
+            <a:r>
+              <a:rPr b="0" lang="en-US" sz="2400" spc="-1" strike="noStrike">
+                <a:solidFill>
+                  <a:srgbClr val="000000"/>
+                </a:solidFill>
+                <a:uFill>
+                  <a:solidFill>
+                    <a:srgbClr val="ffffff"/>
+                  </a:solidFill>
+                </a:uFill>
+                <a:latin typeface="Arial"/>
+              </a:rPr>
+              <a:t>1) research ways to make the accessories line up right</a:t>
+            </a:r>
+            <a:endParaRPr b="0" lang="en-US" sz="1800" spc="-1" strike="noStrike">
+              <a:solidFill>
+                <a:srgbClr val="000000"/>
+              </a:solidFill>
+              <a:uFill>
+                <a:solidFill>
+                  <a:srgbClr val="ffffff"/>
+                </a:solidFill>
+              </a:uFill>
+              <a:latin typeface="Arial"/>
+              <a:ea typeface="Noto Sans CJK SC Regular"/>
+            </a:endParaRPr>
+          </a:p>
+          <a:p>
+            <a:pPr>
+              <a:lnSpc>
+                <a:spcPct val="100000"/>
+              </a:lnSpc>
+            </a:pPr>
+            <a:endParaRPr b="0" lang="en-US" sz="1800" spc="-1" strike="noStrike">
+              <a:solidFill>
+                <a:srgbClr val="000000"/>
+              </a:solidFill>
+              <a:uFill>
+                <a:solidFill>
+                  <a:srgbClr val="ffffff"/>
+                </a:solidFill>
+              </a:uFill>
+              <a:latin typeface="Arial"/>
+              <a:ea typeface="Noto Sans CJK SC Regular"/>
+            </a:endParaRPr>
+          </a:p>
+          <a:p>
+            <a:pPr>
+              <a:lnSpc>
+                <a:spcPct val="100000"/>
+              </a:lnSpc>
+            </a:pPr>
+            <a:r>
+              <a:rPr b="0" lang="en-US" sz="2400" spc="-1" strike="noStrike">
+                <a:solidFill>
+                  <a:srgbClr val="000000"/>
+                </a:solidFill>
+                <a:uFill>
+                  <a:solidFill>
+                    <a:srgbClr val="ffffff"/>
+                  </a:solidFill>
+                </a:uFill>
+                <a:latin typeface="Arial"/>
+              </a:rPr>
+              <a:t>2) add sleep to prevent pet dying overnight</a:t>
+            </a:r>
+            <a:endParaRPr b="0" lang="en-US" sz="1800" spc="-1" strike="noStrike">
+              <a:solidFill>
+                <a:srgbClr val="000000"/>
+              </a:solidFill>
+              <a:uFill>
+                <a:solidFill>
+                  <a:srgbClr val="ffffff"/>
+                </a:solidFill>
+              </a:uFill>
+              <a:latin typeface="Arial"/>
+              <a:ea typeface="Noto Sans CJK SC Regular"/>
+            </a:endParaRPr>
+          </a:p>
+          <a:p>
+            <a:pPr>
+              <a:lnSpc>
+                <a:spcPct val="100000"/>
+              </a:lnSpc>
+            </a:pPr>
+            <a:endParaRPr b="0" lang="en-US" sz="1800" spc="-1" strike="noStrike">
+              <a:solidFill>
+                <a:srgbClr val="000000"/>
+              </a:solidFill>
+              <a:uFill>
+                <a:solidFill>
+                  <a:srgbClr val="ffffff"/>
+                </a:solidFill>
+              </a:uFill>
+              <a:latin typeface="Arial"/>
+              <a:ea typeface="Noto Sans CJK SC Regular"/>
+            </a:endParaRPr>
+          </a:p>
+          <a:p>
+            <a:pPr>
+              <a:lnSpc>
+                <a:spcPct val="100000"/>
+              </a:lnSpc>
+            </a:pPr>
+            <a:r>
+              <a:rPr b="0" lang="en-US" sz="2400" spc="-1" strike="noStrike">
+                <a:solidFill>
+                  <a:srgbClr val="000000"/>
+                </a:solidFill>
+                <a:uFill>
+                  <a:solidFill>
+                    <a:srgbClr val="ffffff"/>
+                  </a:solidFill>
+                </a:uFill>
+                <a:latin typeface="Arial"/>
+              </a:rPr>
+              <a:t>3) add user experience to unlock different types of animals as a pet</a:t>
+            </a:r>
+            <a:endParaRPr b="0" lang="en-US" sz="1800" spc="-1" strike="noStrike">
+              <a:solidFill>
+                <a:srgbClr val="000000"/>
+              </a:solidFill>
+              <a:uFill>
+                <a:solidFill>
+                  <a:srgbClr val="ffffff"/>
+                </a:solidFill>
+              </a:uFill>
+              <a:latin typeface="Arial"/>
+              <a:ea typeface="Noto Sans CJK SC Regular"/>
+            </a:endParaRPr>
+          </a:p>
+          <a:p>
+            <a:pPr>
+              <a:lnSpc>
+                <a:spcPct val="100000"/>
+              </a:lnSpc>
+            </a:pPr>
+            <a:r>
+              <a:rPr b="0" lang="en-US" sz="2400" spc="-1" strike="noStrike">
+                <a:solidFill>
+                  <a:srgbClr val="000000"/>
+                </a:solidFill>
+                <a:uFill>
+                  <a:solidFill>
+                    <a:srgbClr val="ffffff"/>
+                  </a:solidFill>
+                </a:uFill>
+                <a:latin typeface="Arial"/>
+              </a:rPr>
+              <a:t>	</a:t>
+            </a:r>
+            <a:endParaRPr b="0" lang="en-US" sz="1800" spc="-1" strike="noStrike">
+              <a:solidFill>
+                <a:srgbClr val="000000"/>
+              </a:solidFill>
+              <a:uFill>
+                <a:solidFill>
+                  <a:srgbClr val="ffffff"/>
+                </a:solidFill>
+              </a:uFill>
+              <a:latin typeface="Arial"/>
+              <a:ea typeface="Noto Sans CJK SC Regular"/>
+            </a:endParaRPr>
+          </a:p>
+          <a:p>
+            <a:pPr>
+              <a:lnSpc>
+                <a:spcPct val="100000"/>
+              </a:lnSpc>
+            </a:pPr>
+            <a:r>
+              <a:rPr b="0" lang="en-US" sz="2400" spc="-1" strike="noStrike">
+                <a:solidFill>
+                  <a:srgbClr val="000000"/>
+                </a:solidFill>
+                <a:uFill>
+                  <a:solidFill>
+                    <a:srgbClr val="ffffff"/>
+                  </a:solidFill>
+                </a:uFill>
+                <a:latin typeface="Arial"/>
+              </a:rPr>
+              <a:t>4) those different pets may have a preferred food that triggers a super happy reaction</a:t>
+            </a:r>
+            <a:endParaRPr b="0" lang="en-US" sz="1800" spc="-1" strike="noStrike">
+              <a:solidFill>
+                <a:srgbClr val="000000"/>
+              </a:solidFill>
+              <a:uFill>
+                <a:solidFill>
+                  <a:srgbClr val="ffffff"/>
+                </a:solidFill>
+              </a:uFill>
+              <a:latin typeface="Arial"/>
+              <a:ea typeface="Noto Sans CJK SC Regular"/>
+            </a:endParaRPr>
+          </a:p>
+          <a:p>
+            <a:pPr>
+              <a:lnSpc>
+                <a:spcPct val="100000"/>
+              </a:lnSpc>
+            </a:pPr>
+            <a:endParaRPr b="0" lang="en-US" sz="1800" spc="-1" strike="noStrike">
+              <a:solidFill>
+                <a:srgbClr val="000000"/>
+              </a:solidFill>
+              <a:uFill>
+                <a:solidFill>
+                  <a:srgbClr val="ffffff"/>
+                </a:solidFill>
+              </a:uFill>
+              <a:latin typeface="Arial"/>
+              <a:ea typeface="Noto Sans CJK SC Regular"/>
+            </a:endParaRPr>
+          </a:p>
+          <a:p>
+            <a:pPr>
+              <a:lnSpc>
+                <a:spcPct val="100000"/>
+              </a:lnSpc>
+            </a:pPr>
+            <a:r>
+              <a:rPr b="0" lang="en-US" sz="2400" spc="-1" strike="noStrike">
+                <a:solidFill>
+                  <a:srgbClr val="000000"/>
+                </a:solidFill>
+                <a:uFill>
+                  <a:solidFill>
+                    <a:srgbClr val="ffffff"/>
+                  </a:solidFill>
+                </a:uFill>
+                <a:latin typeface="Arial"/>
+              </a:rPr>
+              <a:t>5) unlock different backgrounds for your pet </a:t>
+            </a:r>
+            <a:r>
+              <a:rPr b="0" lang="en-US" sz="1800" spc="-1" strike="noStrike">
+                <a:solidFill>
+                  <a:srgbClr val="000000"/>
+                </a:solidFill>
+                <a:uFill>
+                  <a:solidFill>
+                    <a:srgbClr val="ffffff"/>
+                  </a:solidFill>
+                </a:uFill>
+                <a:latin typeface="Arial"/>
+              </a:rPr>
+              <a:t> </a:t>
+            </a:r>
+            <a:endParaRPr b="0" lang="en-US" sz="1800" spc="-1" strike="noStrike">
+              <a:solidFill>
+                <a:srgbClr val="000000"/>
+              </a:solidFill>
+              <a:uFill>
+                <a:solidFill>
+                  <a:srgbClr val="ffffff"/>
+                </a:solidFill>
+              </a:uFill>
+              <a:latin typeface="Arial"/>
+              <a:ea typeface="Noto Sans CJK SC Regular"/>
+            </a:endParaRPr>
+          </a:p>
+        </p:txBody>
+      </p:sp>
+    </p:spTree>
+  </p:cSld>
+  <p:timing>
+    <p:tnLst>
+      <p:par>
+        <p:cTn id="17" dur="indefinite" restart="never" nodeType="tmRoot">
+          <p:childTnLst>
+            <p:seq>
+              <p:cTn id="18" nodeType="mainSeq"/>
               <p:prevCondLst>
                 <p:cond delay="0" evt="onPrev">
                   <p:tgtEl>
@@ -3502,4 +5828,227 @@
     </a:fmtScheme>
   </a:themeElements>
 </a:theme>
+</file>
+
+<file path=ppt/theme/theme2.xml><?xml version="1.0" encoding="utf-8"?>
+<a:theme xmlns:a="http://schemas.openxmlformats.org/drawingml/2006/main" name="Office Theme">
+  <a:themeElements>
+    <a:clrScheme name="Office">
+      <a:dk1>
+        <a:sysClr val="windowText" lastClr="000000"/>
+      </a:dk1>
+      <a:lt1>
+        <a:sysClr val="window" lastClr="FFFFFF"/>
+      </a:lt1>
+      <a:dk2>
+        <a:srgbClr val="1F497D"/>
+      </a:dk2>
+      <a:lt2>
+        <a:srgbClr val="EEECE1"/>
+      </a:lt2>
+      <a:accent1>
+        <a:srgbClr val="4F81BD"/>
+      </a:accent1>
+      <a:accent2>
+        <a:srgbClr val="C0504D"/>
+      </a:accent2>
+      <a:accent3>
+        <a:srgbClr val="9BBB59"/>
+      </a:accent3>
+      <a:accent4>
+        <a:srgbClr val="8064A2"/>
+      </a:accent4>
+      <a:accent5>
+        <a:srgbClr val="4BACC6"/>
+      </a:accent5>
+      <a:accent6>
+        <a:srgbClr val="F79646"/>
+      </a:accent6>
+      <a:hlink>
+        <a:srgbClr val="0000FF"/>
+      </a:hlink>
+      <a:folHlink>
+        <a:srgbClr val="800080"/>
+      </a:folHlink>
+    </a:clrScheme>
+    <a:fontScheme name="Office">
+      <a:majorFont>
+        <a:latin typeface="Arial"/>
+        <a:ea typeface="DejaVu Sans"/>
+        <a:cs typeface="DejaVu Sans"/>
+      </a:majorFont>
+      <a:minorFont>
+        <a:latin typeface="Arial"/>
+        <a:ea typeface="DejaVu Sans"/>
+        <a:cs typeface="DejaVu Sans"/>
+      </a:minorFont>
+    </a:fontScheme>
+    <a:fmtScheme name="Office">
+      <a:fillStyleLst>
+        <a:solidFill>
+          <a:schemeClr val="phClr"/>
+        </a:solidFill>
+        <a:gradFill rotWithShape="1">
+          <a:gsLst>
+            <a:gs pos="0">
+              <a:schemeClr val="phClr">
+                <a:tint val="50000"/>
+                <a:satMod val="300000"/>
+              </a:schemeClr>
+            </a:gs>
+            <a:gs pos="35000">
+              <a:schemeClr val="phClr">
+                <a:tint val="37000"/>
+                <a:satMod val="300000"/>
+              </a:schemeClr>
+            </a:gs>
+            <a:gs pos="100000">
+              <a:schemeClr val="phClr">
+                <a:tint val="15000"/>
+                <a:satMod val="350000"/>
+              </a:schemeClr>
+            </a:gs>
+          </a:gsLst>
+          <a:lin ang="16200000" scaled="1"/>
+        </a:gradFill>
+        <a:gradFill rotWithShape="1">
+          <a:gsLst>
+            <a:gs pos="0">
+              <a:schemeClr val="phClr">
+                <a:shade val="51000"/>
+                <a:satMod val="130000"/>
+              </a:schemeClr>
+            </a:gs>
+            <a:gs pos="80000">
+              <a:schemeClr val="phClr">
+                <a:shade val="93000"/>
+                <a:satMod val="130000"/>
+              </a:schemeClr>
+            </a:gs>
+            <a:gs pos="100000">
+              <a:schemeClr val="phClr">
+                <a:shade val="94000"/>
+                <a:satMod val="135000"/>
+              </a:schemeClr>
+            </a:gs>
+          </a:gsLst>
+          <a:lin ang="16200000" scaled="0"/>
+        </a:gradFill>
+      </a:fillStyleLst>
+      <a:lnStyleLst>
+        <a:ln w="9525" cap="flat" cmpd="sng" algn="ctr">
+          <a:solidFill>
+            <a:schemeClr val="phClr">
+              <a:shade val="95000"/>
+              <a:satMod val="105000"/>
+            </a:schemeClr>
+          </a:solidFill>
+          <a:prstDash val="solid"/>
+        </a:ln>
+        <a:ln w="25400" cap="flat" cmpd="sng" algn="ctr">
+          <a:solidFill>
+            <a:schemeClr val="phClr"/>
+          </a:solidFill>
+          <a:prstDash val="solid"/>
+        </a:ln>
+        <a:ln w="38100" cap="flat" cmpd="sng" algn="ctr">
+          <a:solidFill>
+            <a:schemeClr val="phClr"/>
+          </a:solidFill>
+          <a:prstDash val="solid"/>
+        </a:ln>
+      </a:lnStyleLst>
+      <a:effectStyleLst>
+        <a:effectStyle>
+          <a:effectLst>
+            <a:outerShdw blurRad="40000" dist="20000" dir="5400000" rotWithShape="0">
+              <a:srgbClr val="000000">
+                <a:alpha val="38000"/>
+              </a:srgbClr>
+            </a:outerShdw>
+          </a:effectLst>
+        </a:effectStyle>
+        <a:effectStyle>
+          <a:effectLst>
+            <a:outerShdw blurRad="40000" dist="23000" dir="5400000" rotWithShape="0">
+              <a:srgbClr val="000000">
+                <a:alpha val="35000"/>
+              </a:srgbClr>
+            </a:outerShdw>
+          </a:effectLst>
+        </a:effectStyle>
+        <a:effectStyle>
+          <a:effectLst>
+            <a:outerShdw blurRad="40000" dist="23000" dir="5400000" rotWithShape="0">
+              <a:srgbClr val="000000">
+                <a:alpha val="35000"/>
+              </a:srgbClr>
+            </a:outerShdw>
+          </a:effectLst>
+          <a:scene3d>
+            <a:camera prst="orthographicFront">
+              <a:rot lat="0" lon="0" rev="0"/>
+            </a:camera>
+            <a:lightRig rig="threePt" dir="t">
+              <a:rot lat="0" lon="0" rev="1200000"/>
+            </a:lightRig>
+          </a:scene3d>
+          <a:sp3d>
+            <a:bevelT w="63500" h="25400"/>
+          </a:sp3d>
+        </a:effectStyle>
+      </a:effectStyleLst>
+      <a:bgFillStyleLst>
+        <a:solidFill>
+          <a:schemeClr val="phClr"/>
+        </a:solidFill>
+        <a:gradFill rotWithShape="1">
+          <a:gsLst>
+            <a:gs pos="0">
+              <a:schemeClr val="phClr">
+                <a:tint val="40000"/>
+                <a:satMod val="350000"/>
+              </a:schemeClr>
+            </a:gs>
+            <a:gs pos="40000">
+              <a:schemeClr val="phClr">
+                <a:tint val="45000"/>
+                <a:shade val="99000"/>
+                <a:satMod val="350000"/>
+              </a:schemeClr>
+            </a:gs>
+            <a:gs pos="100000">
+              <a:schemeClr val="phClr">
+                <a:shade val="20000"/>
+                <a:satMod val="255000"/>
+              </a:schemeClr>
+            </a:gs>
+          </a:gsLst>
+          <a:path path="circle">
+            <a:fillToRect l="50000" t="-80000" r="50000" b="180000"/>
+          </a:path>
+        </a:gradFill>
+        <a:gradFill rotWithShape="1">
+          <a:gsLst>
+            <a:gs pos="0">
+              <a:schemeClr val="phClr">
+                <a:tint val="80000"/>
+                <a:satMod val="300000"/>
+              </a:schemeClr>
+            </a:gs>
+            <a:gs pos="100000">
+              <a:schemeClr val="phClr">
+                <a:shade val="30000"/>
+                <a:satMod val="200000"/>
+              </a:schemeClr>
+            </a:gs>
+          </a:gsLst>
+          <a:path path="circle">
+            <a:fillToRect l="50000" t="50000" r="50000" b="50000"/>
+          </a:path>
+        </a:gradFill>
+      </a:bgFillStyleLst>
+    </a:fmtScheme>
+  </a:themeElements>
+</a:theme>
 </file>
</xml_diff>